<commit_message>
Add tests for XHR calls
</commit_message>
<xml_diff>
--- a/resume.pptx
+++ b/resume.pptx
@@ -130,10 +130,10 @@
   </p:defaultTextStyle>
   <p:extLst>
     <p:ext uri="{EFAFB233-063F-42B5-8137-9DF3F51BA10A}">
-      <p15:sldGuideLst xmlns:p15="http://schemas.microsoft.com/office/powerpoint/2012/main"/>
+      <p15:sldGuideLst xmlns:p15="http://schemas.microsoft.com/office/powerpoint/2012/main" xmlns=""/>
     </p:ext>
     <p:ext uri="{2D200454-40CA-4A62-9FC3-DE9A4176ACB9}">
-      <p15:notesGuideLst xmlns:p15="http://schemas.microsoft.com/office/powerpoint/2012/main"/>
+      <p15:notesGuideLst xmlns:p15="http://schemas.microsoft.com/office/powerpoint/2012/main" xmlns=""/>
     </p:ext>
   </p:extLst>
 </p:presentation>
@@ -1189,6 +1189,13 @@
         </dgm:presLayoutVars>
       </dgm:prSet>
       <dgm:spPr/>
+      <dgm:t>
+        <a:bodyPr/>
+        <a:lstStyle/>
+        <a:p>
+          <a:endParaRPr lang="en-US"/>
+        </a:p>
+      </dgm:t>
     </dgm:pt>
     <dgm:pt modelId="{98B0D8FA-33BD-482B-B6F4-3F5E0198F6C8}" type="pres">
       <dgm:prSet presAssocID="{FA16F164-7E64-4B90-A525-8E0B2A2DD444}" presName="sibTrans" presStyleCnt="0"/>
@@ -1201,6 +1208,13 @@
         </dgm:presLayoutVars>
       </dgm:prSet>
       <dgm:spPr/>
+      <dgm:t>
+        <a:bodyPr/>
+        <a:lstStyle/>
+        <a:p>
+          <a:endParaRPr lang="en-US"/>
+        </a:p>
+      </dgm:t>
     </dgm:pt>
     <dgm:pt modelId="{051DD4FC-166F-4F02-A39E-A452BC910E06}" type="pres">
       <dgm:prSet presAssocID="{55DCBB83-7C6D-46A7-82CA-027E0B477E95}" presName="sibTrans" presStyleCnt="0"/>
@@ -1213,6 +1227,13 @@
         </dgm:presLayoutVars>
       </dgm:prSet>
       <dgm:spPr/>
+      <dgm:t>
+        <a:bodyPr/>
+        <a:lstStyle/>
+        <a:p>
+          <a:endParaRPr lang="en-US"/>
+        </a:p>
+      </dgm:t>
     </dgm:pt>
     <dgm:pt modelId="{77643FC8-7395-470F-A138-D10FAD0F0C7F}" type="pres">
       <dgm:prSet presAssocID="{C9026DD8-2164-4B97-A10F-513BD9C5AE66}" presName="sibTrans" presStyleCnt="0"/>
@@ -1225,6 +1246,13 @@
         </dgm:presLayoutVars>
       </dgm:prSet>
       <dgm:spPr/>
+      <dgm:t>
+        <a:bodyPr/>
+        <a:lstStyle/>
+        <a:p>
+          <a:endParaRPr lang="en-US"/>
+        </a:p>
+      </dgm:t>
     </dgm:pt>
   </dgm:ptLst>
   <dgm:cxnLst>
@@ -1265,454 +1293,6 @@
       <dsp:cNvGrpSpPr/>
     </dsp:nvGrpSpPr>
     <dsp:grpSpPr/>
-    <dsp:sp modelId="{C19FBA30-382B-44E2-8C1D-137A6F897C28}">
-      <dsp:nvSpPr>
-        <dsp:cNvPr id="0" name=""/>
-        <dsp:cNvSpPr/>
-      </dsp:nvSpPr>
-      <dsp:spPr>
-        <a:xfrm>
-          <a:off x="619648" y="0"/>
-          <a:ext cx="7022680" cy="2448272"/>
-        </a:xfrm>
-        <a:prstGeom prst="rightArrow">
-          <a:avLst/>
-        </a:prstGeom>
-        <a:solidFill>
-          <a:schemeClr val="accent3">
-            <a:tint val="40000"/>
-            <a:hueOff val="0"/>
-            <a:satOff val="0"/>
-            <a:lumOff val="0"/>
-            <a:alphaOff val="0"/>
-          </a:schemeClr>
-        </a:solidFill>
-        <a:ln>
-          <a:noFill/>
-        </a:ln>
-        <a:effectLst/>
-      </dsp:spPr>
-      <dsp:style>
-        <a:lnRef idx="0">
-          <a:scrgbClr r="0" g="0" b="0"/>
-        </a:lnRef>
-        <a:fillRef idx="1">
-          <a:scrgbClr r="0" g="0" b="0"/>
-        </a:fillRef>
-        <a:effectRef idx="2">
-          <a:scrgbClr r="0" g="0" b="0"/>
-        </a:effectRef>
-        <a:fontRef idx="minor"/>
-      </dsp:style>
-    </dsp:sp>
-    <dsp:sp modelId="{3BE67301-9880-4FEC-99F7-88569348EA0D}">
-      <dsp:nvSpPr>
-        <dsp:cNvPr id="0" name=""/>
-        <dsp:cNvSpPr/>
-      </dsp:nvSpPr>
-      <dsp:spPr>
-        <a:xfrm>
-          <a:off x="2823" y="734481"/>
-          <a:ext cx="1834739" cy="979308"/>
-        </a:xfrm>
-        <a:prstGeom prst="roundRect">
-          <a:avLst/>
-        </a:prstGeom>
-        <a:gradFill rotWithShape="0">
-          <a:gsLst>
-            <a:gs pos="0">
-              <a:schemeClr val="accent3">
-                <a:shade val="80000"/>
-                <a:hueOff val="0"/>
-                <a:satOff val="0"/>
-                <a:lumOff val="0"/>
-                <a:alphaOff val="0"/>
-                <a:satMod val="103000"/>
-                <a:lumMod val="102000"/>
-                <a:tint val="94000"/>
-              </a:schemeClr>
-            </a:gs>
-            <a:gs pos="50000">
-              <a:schemeClr val="accent3">
-                <a:shade val="80000"/>
-                <a:hueOff val="0"/>
-                <a:satOff val="0"/>
-                <a:lumOff val="0"/>
-                <a:alphaOff val="0"/>
-                <a:satMod val="110000"/>
-                <a:lumMod val="100000"/>
-                <a:shade val="100000"/>
-              </a:schemeClr>
-            </a:gs>
-            <a:gs pos="100000">
-              <a:schemeClr val="accent3">
-                <a:shade val="80000"/>
-                <a:hueOff val="0"/>
-                <a:satOff val="0"/>
-                <a:lumOff val="0"/>
-                <a:alphaOff val="0"/>
-                <a:lumMod val="99000"/>
-                <a:satMod val="120000"/>
-                <a:shade val="78000"/>
-              </a:schemeClr>
-            </a:gs>
-          </a:gsLst>
-          <a:lin ang="5400000" scaled="0"/>
-        </a:gradFill>
-        <a:ln>
-          <a:noFill/>
-        </a:ln>
-        <a:effectLst/>
-      </dsp:spPr>
-      <dsp:style>
-        <a:lnRef idx="0">
-          <a:scrgbClr r="0" g="0" b="0"/>
-        </a:lnRef>
-        <a:fillRef idx="3">
-          <a:scrgbClr r="0" g="0" b="0"/>
-        </a:fillRef>
-        <a:effectRef idx="2">
-          <a:scrgbClr r="0" g="0" b="0"/>
-        </a:effectRef>
-        <a:fontRef idx="minor">
-          <a:schemeClr val="lt1"/>
-        </a:fontRef>
-      </dsp:style>
-      <dsp:txBody>
-        <a:bodyPr spcFirstLastPara="0" vert="horz" wrap="square" lIns="76200" tIns="76200" rIns="76200" bIns="76200" numCol="1" spcCol="1270" anchor="ctr" anchorCtr="0">
-          <a:noAutofit/>
-        </a:bodyPr>
-        <a:lstStyle/>
-        <a:p>
-          <a:pPr marL="0" lvl="0" indent="0" algn="ctr" defTabSz="889000">
-            <a:lnSpc>
-              <a:spcPct val="90000"/>
-            </a:lnSpc>
-            <a:spcBef>
-              <a:spcPct val="0"/>
-            </a:spcBef>
-            <a:spcAft>
-              <a:spcPct val="35000"/>
-            </a:spcAft>
-            <a:buNone/>
-          </a:pPr>
-          <a:r>
-            <a:rPr lang="es-ES" sz="2000" kern="1200" dirty="0"/>
-            <a:t>SPRINT 1</a:t>
-          </a:r>
-        </a:p>
-      </dsp:txBody>
-      <dsp:txXfrm>
-        <a:off x="50629" y="782287"/>
-        <a:ext cx="1739127" cy="883696"/>
-      </dsp:txXfrm>
-    </dsp:sp>
-    <dsp:sp modelId="{41F7C86B-E9DC-4364-8A2B-DD3371CBF3D3}">
-      <dsp:nvSpPr>
-        <dsp:cNvPr id="0" name=""/>
-        <dsp:cNvSpPr/>
-      </dsp:nvSpPr>
-      <dsp:spPr>
-        <a:xfrm>
-          <a:off x="2143353" y="734481"/>
-          <a:ext cx="1834739" cy="979308"/>
-        </a:xfrm>
-        <a:prstGeom prst="roundRect">
-          <a:avLst/>
-        </a:prstGeom>
-        <a:gradFill rotWithShape="0">
-          <a:gsLst>
-            <a:gs pos="0">
-              <a:schemeClr val="accent3">
-                <a:shade val="80000"/>
-                <a:hueOff val="0"/>
-                <a:satOff val="0"/>
-                <a:lumOff val="6364"/>
-                <a:alphaOff val="0"/>
-                <a:satMod val="103000"/>
-                <a:lumMod val="102000"/>
-                <a:tint val="94000"/>
-              </a:schemeClr>
-            </a:gs>
-            <a:gs pos="50000">
-              <a:schemeClr val="accent3">
-                <a:shade val="80000"/>
-                <a:hueOff val="0"/>
-                <a:satOff val="0"/>
-                <a:lumOff val="6364"/>
-                <a:alphaOff val="0"/>
-                <a:satMod val="110000"/>
-                <a:lumMod val="100000"/>
-                <a:shade val="100000"/>
-              </a:schemeClr>
-            </a:gs>
-            <a:gs pos="100000">
-              <a:schemeClr val="accent3">
-                <a:shade val="80000"/>
-                <a:hueOff val="0"/>
-                <a:satOff val="0"/>
-                <a:lumOff val="6364"/>
-                <a:alphaOff val="0"/>
-                <a:lumMod val="99000"/>
-                <a:satMod val="120000"/>
-                <a:shade val="78000"/>
-              </a:schemeClr>
-            </a:gs>
-          </a:gsLst>
-          <a:lin ang="5400000" scaled="0"/>
-        </a:gradFill>
-        <a:ln>
-          <a:noFill/>
-        </a:ln>
-        <a:effectLst/>
-      </dsp:spPr>
-      <dsp:style>
-        <a:lnRef idx="0">
-          <a:scrgbClr r="0" g="0" b="0"/>
-        </a:lnRef>
-        <a:fillRef idx="3">
-          <a:scrgbClr r="0" g="0" b="0"/>
-        </a:fillRef>
-        <a:effectRef idx="2">
-          <a:scrgbClr r="0" g="0" b="0"/>
-        </a:effectRef>
-        <a:fontRef idx="minor">
-          <a:schemeClr val="lt1"/>
-        </a:fontRef>
-      </dsp:style>
-      <dsp:txBody>
-        <a:bodyPr spcFirstLastPara="0" vert="horz" wrap="square" lIns="76200" tIns="76200" rIns="76200" bIns="76200" numCol="1" spcCol="1270" anchor="ctr" anchorCtr="0">
-          <a:noAutofit/>
-        </a:bodyPr>
-        <a:lstStyle/>
-        <a:p>
-          <a:pPr marL="0" lvl="0" indent="0" algn="ctr" defTabSz="889000">
-            <a:lnSpc>
-              <a:spcPct val="90000"/>
-            </a:lnSpc>
-            <a:spcBef>
-              <a:spcPct val="0"/>
-            </a:spcBef>
-            <a:spcAft>
-              <a:spcPct val="35000"/>
-            </a:spcAft>
-            <a:buNone/>
-          </a:pPr>
-          <a:r>
-            <a:rPr lang="es-ES" sz="2000" kern="1200" dirty="0"/>
-            <a:t>SPRINT 2</a:t>
-          </a:r>
-        </a:p>
-      </dsp:txBody>
-      <dsp:txXfrm>
-        <a:off x="2191159" y="782287"/>
-        <a:ext cx="1739127" cy="883696"/>
-      </dsp:txXfrm>
-    </dsp:sp>
-    <dsp:sp modelId="{4BAD5466-94E1-47CA-9FAA-DDD3B7595BCC}">
-      <dsp:nvSpPr>
-        <dsp:cNvPr id="0" name=""/>
-        <dsp:cNvSpPr/>
-      </dsp:nvSpPr>
-      <dsp:spPr>
-        <a:xfrm>
-          <a:off x="4283883" y="734481"/>
-          <a:ext cx="1834739" cy="979308"/>
-        </a:xfrm>
-        <a:prstGeom prst="roundRect">
-          <a:avLst/>
-        </a:prstGeom>
-        <a:gradFill rotWithShape="0">
-          <a:gsLst>
-            <a:gs pos="0">
-              <a:schemeClr val="accent3">
-                <a:shade val="80000"/>
-                <a:hueOff val="0"/>
-                <a:satOff val="0"/>
-                <a:lumOff val="12728"/>
-                <a:alphaOff val="0"/>
-                <a:satMod val="103000"/>
-                <a:lumMod val="102000"/>
-                <a:tint val="94000"/>
-              </a:schemeClr>
-            </a:gs>
-            <a:gs pos="50000">
-              <a:schemeClr val="accent3">
-                <a:shade val="80000"/>
-                <a:hueOff val="0"/>
-                <a:satOff val="0"/>
-                <a:lumOff val="12728"/>
-                <a:alphaOff val="0"/>
-                <a:satMod val="110000"/>
-                <a:lumMod val="100000"/>
-                <a:shade val="100000"/>
-              </a:schemeClr>
-            </a:gs>
-            <a:gs pos="100000">
-              <a:schemeClr val="accent3">
-                <a:shade val="80000"/>
-                <a:hueOff val="0"/>
-                <a:satOff val="0"/>
-                <a:lumOff val="12728"/>
-                <a:alphaOff val="0"/>
-                <a:lumMod val="99000"/>
-                <a:satMod val="120000"/>
-                <a:shade val="78000"/>
-              </a:schemeClr>
-            </a:gs>
-          </a:gsLst>
-          <a:lin ang="5400000" scaled="0"/>
-        </a:gradFill>
-        <a:ln>
-          <a:noFill/>
-        </a:ln>
-        <a:effectLst/>
-      </dsp:spPr>
-      <dsp:style>
-        <a:lnRef idx="0">
-          <a:scrgbClr r="0" g="0" b="0"/>
-        </a:lnRef>
-        <a:fillRef idx="3">
-          <a:scrgbClr r="0" g="0" b="0"/>
-        </a:fillRef>
-        <a:effectRef idx="2">
-          <a:scrgbClr r="0" g="0" b="0"/>
-        </a:effectRef>
-        <a:fontRef idx="minor">
-          <a:schemeClr val="lt1"/>
-        </a:fontRef>
-      </dsp:style>
-      <dsp:txBody>
-        <a:bodyPr spcFirstLastPara="0" vert="horz" wrap="square" lIns="76200" tIns="76200" rIns="76200" bIns="76200" numCol="1" spcCol="1270" anchor="ctr" anchorCtr="0">
-          <a:noAutofit/>
-        </a:bodyPr>
-        <a:lstStyle/>
-        <a:p>
-          <a:pPr marL="0" lvl="0" indent="0" algn="ctr" defTabSz="889000">
-            <a:lnSpc>
-              <a:spcPct val="90000"/>
-            </a:lnSpc>
-            <a:spcBef>
-              <a:spcPct val="0"/>
-            </a:spcBef>
-            <a:spcAft>
-              <a:spcPct val="35000"/>
-            </a:spcAft>
-            <a:buNone/>
-          </a:pPr>
-          <a:r>
-            <a:rPr lang="es-ES" sz="2000" kern="1200" dirty="0"/>
-            <a:t>SPRINT…</a:t>
-          </a:r>
-        </a:p>
-      </dsp:txBody>
-      <dsp:txXfrm>
-        <a:off x="4331689" y="782287"/>
-        <a:ext cx="1739127" cy="883696"/>
-      </dsp:txXfrm>
-    </dsp:sp>
-    <dsp:sp modelId="{467EE60E-61AA-427F-A830-D12F30BF2A28}">
-      <dsp:nvSpPr>
-        <dsp:cNvPr id="0" name=""/>
-        <dsp:cNvSpPr/>
-      </dsp:nvSpPr>
-      <dsp:spPr>
-        <a:xfrm>
-          <a:off x="6424413" y="734481"/>
-          <a:ext cx="1834739" cy="979308"/>
-        </a:xfrm>
-        <a:prstGeom prst="roundRect">
-          <a:avLst/>
-        </a:prstGeom>
-        <a:gradFill rotWithShape="0">
-          <a:gsLst>
-            <a:gs pos="0">
-              <a:schemeClr val="accent3">
-                <a:shade val="80000"/>
-                <a:hueOff val="0"/>
-                <a:satOff val="0"/>
-                <a:lumOff val="19092"/>
-                <a:alphaOff val="0"/>
-                <a:satMod val="103000"/>
-                <a:lumMod val="102000"/>
-                <a:tint val="94000"/>
-              </a:schemeClr>
-            </a:gs>
-            <a:gs pos="50000">
-              <a:schemeClr val="accent3">
-                <a:shade val="80000"/>
-                <a:hueOff val="0"/>
-                <a:satOff val="0"/>
-                <a:lumOff val="19092"/>
-                <a:alphaOff val="0"/>
-                <a:satMod val="110000"/>
-                <a:lumMod val="100000"/>
-                <a:shade val="100000"/>
-              </a:schemeClr>
-            </a:gs>
-            <a:gs pos="100000">
-              <a:schemeClr val="accent3">
-                <a:shade val="80000"/>
-                <a:hueOff val="0"/>
-                <a:satOff val="0"/>
-                <a:lumOff val="19092"/>
-                <a:alphaOff val="0"/>
-                <a:lumMod val="99000"/>
-                <a:satMod val="120000"/>
-                <a:shade val="78000"/>
-              </a:schemeClr>
-            </a:gs>
-          </a:gsLst>
-          <a:lin ang="5400000" scaled="0"/>
-        </a:gradFill>
-        <a:ln>
-          <a:noFill/>
-        </a:ln>
-        <a:effectLst/>
-      </dsp:spPr>
-      <dsp:style>
-        <a:lnRef idx="0">
-          <a:scrgbClr r="0" g="0" b="0"/>
-        </a:lnRef>
-        <a:fillRef idx="3">
-          <a:scrgbClr r="0" g="0" b="0"/>
-        </a:fillRef>
-        <a:effectRef idx="2">
-          <a:scrgbClr r="0" g="0" b="0"/>
-        </a:effectRef>
-        <a:fontRef idx="minor">
-          <a:schemeClr val="lt1"/>
-        </a:fontRef>
-      </dsp:style>
-      <dsp:txBody>
-        <a:bodyPr spcFirstLastPara="0" vert="horz" wrap="square" lIns="76200" tIns="76200" rIns="76200" bIns="76200" numCol="1" spcCol="1270" anchor="ctr" anchorCtr="0">
-          <a:noAutofit/>
-        </a:bodyPr>
-        <a:lstStyle/>
-        <a:p>
-          <a:pPr marL="0" lvl="0" indent="0" algn="ctr" defTabSz="889000">
-            <a:lnSpc>
-              <a:spcPct val="90000"/>
-            </a:lnSpc>
-            <a:spcBef>
-              <a:spcPct val="0"/>
-            </a:spcBef>
-            <a:spcAft>
-              <a:spcPct val="35000"/>
-            </a:spcAft>
-            <a:buNone/>
-          </a:pPr>
-          <a:r>
-            <a:rPr lang="es-ES" sz="2000" kern="1200" dirty="0"/>
-            <a:t>SPRINT N</a:t>
-          </a:r>
-        </a:p>
-      </dsp:txBody>
-      <dsp:txXfrm>
-        <a:off x="6472219" y="782287"/>
-        <a:ext cx="1739127" cy="883696"/>
-      </dsp:txXfrm>
-    </dsp:sp>
   </dsp:spTree>
 </dsp:drawing>
 </file>
@@ -2987,7 +2567,7 @@
           <a:p>
             <a:fld id="{1524C607-EC43-4D45-819C-01ED569A62A9}" type="datetimeFigureOut">
               <a:rPr lang="es-ES_tradnl" smtClean="0"/>
-              <a:t>12/06/2016</a:t>
+              <a:t>13/06/2016</a:t>
             </a:fld>
             <a:endParaRPr lang="es-ES_tradnl" dirty="0"/>
           </a:p>
@@ -3053,7 +2633,7 @@
           <a:p>
             <a:fld id="{22FF3C80-5006-4947-B2EA-4A4A50684FF5}" type="slidenum">
               <a:rPr lang="es-ES_tradnl" smtClean="0"/>
-              <a:t>‹Nº›</a:t>
+              <a:t>‹#›</a:t>
             </a:fld>
             <a:endParaRPr lang="es-ES_tradnl" dirty="0"/>
           </a:p>
@@ -3152,7 +2732,7 @@
           <a:p>
             <a:fld id="{26D2F09D-BAE4-494B-8CCF-2A216F98B43B}" type="datetimeFigureOut">
               <a:rPr lang="es-ES_tradnl" smtClean="0"/>
-              <a:t>12/06/2016</a:t>
+              <a:t>13/06/2016</a:t>
             </a:fld>
             <a:endParaRPr lang="es-ES_tradnl" dirty="0"/>
           </a:p>
@@ -3311,7 +2891,7 @@
           <a:p>
             <a:fld id="{2062F163-3063-474E-9A8A-E961A784F045}" type="slidenum">
               <a:rPr lang="es-ES_tradnl" smtClean="0"/>
-              <a:t>‹Nº›</a:t>
+              <a:t>‹#›</a:t>
             </a:fld>
             <a:endParaRPr lang="es-ES_tradnl" dirty="0"/>
           </a:p>
@@ -16147,8 +15727,23 @@
               <a:t>, typescript, </a:t>
             </a:r>
             <a:r>
-              <a:rPr lang="en-US" dirty="0" err="1"/>
+              <a:rPr lang="en-US" dirty="0" err="1" smtClean="0"/>
               <a:t>angularJS</a:t>
+            </a:r>
+            <a:endParaRPr lang="en-US" dirty="0" smtClean="0"/>
+          </a:p>
+          <a:p>
+            <a:r>
+              <a:rPr lang="en-US" dirty="0" smtClean="0"/>
+              <a:t>Testing with </a:t>
+            </a:r>
+            <a:r>
+              <a:rPr lang="en-US" dirty="0" smtClean="0"/>
+              <a:t>jasmine </a:t>
+            </a:r>
+            <a:r>
+              <a:rPr lang="en-US" smtClean="0"/>
+              <a:t>and karma</a:t>
             </a:r>
             <a:endParaRPr lang="en-US" dirty="0"/>
           </a:p>
@@ -18115,7 +17710,7 @@
   <a:extraClrSchemeLst/>
   <a:extLst>
     <a:ext uri="{05A4C25C-085E-4340-85A3-A5531E510DB2}">
-      <thm15:themeFamily xmlns:thm15="http://schemas.microsoft.com/office/thememl/2012/main" name="Office Theme" id="{62F939B6-93AF-4DB8-9C6B-D6C7DFDC589F}" vid="{4A3C46E8-61CC-4603-A589-7422A47A8E4A}"/>
+      <thm15:themeFamily xmlns:thm15="http://schemas.microsoft.com/office/thememl/2012/main" xmlns="" name="Office Theme" id="{62F939B6-93AF-4DB8-9C6B-D6C7DFDC589F}" vid="{4A3C46E8-61CC-4603-A589-7422A47A8E4A}"/>
     </a:ext>
   </a:extLst>
 </a:theme>
@@ -18376,7 +17971,7 @@
   <a:extraClrSchemeLst/>
   <a:extLst>
     <a:ext uri="{05A4C25C-085E-4340-85A3-A5531E510DB2}">
-      <thm15:themeFamily xmlns:thm15="http://schemas.microsoft.com/office/thememl/2012/main" name="Office Theme" id="{62F939B6-93AF-4DB8-9C6B-D6C7DFDC589F}" vid="{4A3C46E8-61CC-4603-A589-7422A47A8E4A}"/>
+      <thm15:themeFamily xmlns:thm15="http://schemas.microsoft.com/office/thememl/2012/main" xmlns="" name="Office Theme" id="{62F939B6-93AF-4DB8-9C6B-D6C7DFDC589F}" vid="{4A3C46E8-61CC-4603-A589-7422A47A8E4A}"/>
     </a:ext>
   </a:extLst>
 </a:theme>
@@ -18637,7 +18232,7 @@
   <a:extraClrSchemeLst/>
   <a:extLst>
     <a:ext uri="{05A4C25C-085E-4340-85A3-A5531E510DB2}">
-      <thm15:themeFamily xmlns:thm15="http://schemas.microsoft.com/office/thememl/2012/main" name="Office Theme" id="{62F939B6-93AF-4DB8-9C6B-D6C7DFDC589F}" vid="{4A3C46E8-61CC-4603-A589-7422A47A8E4A}"/>
+      <thm15:themeFamily xmlns:thm15="http://schemas.microsoft.com/office/thememl/2012/main" xmlns="" name="Office Theme" id="{62F939B6-93AF-4DB8-9C6B-D6C7DFDC589F}" vid="{4A3C46E8-61CC-4603-A589-7422A47A8E4A}"/>
     </a:ext>
   </a:extLst>
 </a:theme>
@@ -18898,7 +18493,7 @@
   <a:extraClrSchemeLst/>
   <a:extLst>
     <a:ext uri="{05A4C25C-085E-4340-85A3-A5531E510DB2}">
-      <thm15:themeFamily xmlns:thm15="http://schemas.microsoft.com/office/thememl/2012/main" name="Office Theme" id="{62F939B6-93AF-4DB8-9C6B-D6C7DFDC589F}" vid="{4A3C46E8-61CC-4603-A589-7422A47A8E4A}"/>
+      <thm15:themeFamily xmlns:thm15="http://schemas.microsoft.com/office/thememl/2012/main" xmlns="" name="Office Theme" id="{62F939B6-93AF-4DB8-9C6B-D6C7DFDC589F}" vid="{4A3C46E8-61CC-4603-A589-7422A47A8E4A}"/>
     </a:ext>
   </a:extLst>
 </a:theme>
@@ -19159,7 +18754,7 @@
   <a:extraClrSchemeLst/>
   <a:extLst>
     <a:ext uri="{05A4C25C-085E-4340-85A3-A5531E510DB2}">
-      <thm15:themeFamily xmlns:thm15="http://schemas.microsoft.com/office/thememl/2012/main" name="Office Theme" id="{62F939B6-93AF-4DB8-9C6B-D6C7DFDC589F}" vid="{4A3C46E8-61CC-4603-A589-7422A47A8E4A}"/>
+      <thm15:themeFamily xmlns:thm15="http://schemas.microsoft.com/office/thememl/2012/main" xmlns="" name="Office Theme" id="{62F939B6-93AF-4DB8-9C6B-D6C7DFDC589F}" vid="{4A3C46E8-61CC-4603-A589-7422A47A8E4A}"/>
     </a:ext>
   </a:extLst>
 </a:theme>
@@ -19420,7 +19015,7 @@
   <a:extraClrSchemeLst/>
   <a:extLst>
     <a:ext uri="{05A4C25C-085E-4340-85A3-A5531E510DB2}">
-      <thm15:themeFamily xmlns:thm15="http://schemas.microsoft.com/office/thememl/2012/main" name="Office Theme" id="{62F939B6-93AF-4DB8-9C6B-D6C7DFDC589F}" vid="{4A3C46E8-61CC-4603-A589-7422A47A8E4A}"/>
+      <thm15:themeFamily xmlns:thm15="http://schemas.microsoft.com/office/thememl/2012/main" xmlns="" name="Office Theme" id="{62F939B6-93AF-4DB8-9C6B-D6C7DFDC589F}" vid="{4A3C46E8-61CC-4603-A589-7422A47A8E4A}"/>
     </a:ext>
   </a:extLst>
 </a:theme>
@@ -19681,7 +19276,7 @@
   <a:extraClrSchemeLst/>
   <a:extLst>
     <a:ext uri="{05A4C25C-085E-4340-85A3-A5531E510DB2}">
-      <thm15:themeFamily xmlns:thm15="http://schemas.microsoft.com/office/thememl/2012/main" name="Office Theme" id="{62F939B6-93AF-4DB8-9C6B-D6C7DFDC589F}" vid="{4A3C46E8-61CC-4603-A589-7422A47A8E4A}"/>
+      <thm15:themeFamily xmlns:thm15="http://schemas.microsoft.com/office/thememl/2012/main" xmlns="" name="Office Theme" id="{62F939B6-93AF-4DB8-9C6B-D6C7DFDC589F}" vid="{4A3C46E8-61CC-4603-A589-7422A47A8E4A}"/>
     </a:ext>
   </a:extLst>
 </a:theme>
@@ -19942,7 +19537,7 @@
   <a:extraClrSchemeLst/>
   <a:extLst>
     <a:ext uri="{05A4C25C-085E-4340-85A3-A5531E510DB2}">
-      <thm15:themeFamily xmlns:thm15="http://schemas.microsoft.com/office/thememl/2012/main" name="Office Theme" id="{62F939B6-93AF-4DB8-9C6B-D6C7DFDC589F}" vid="{4A3C46E8-61CC-4603-A589-7422A47A8E4A}"/>
+      <thm15:themeFamily xmlns:thm15="http://schemas.microsoft.com/office/thememl/2012/main" xmlns="" name="Office Theme" id="{62F939B6-93AF-4DB8-9C6B-D6C7DFDC589F}" vid="{4A3C46E8-61CC-4603-A589-7422A47A8E4A}"/>
     </a:ext>
   </a:extLst>
 </a:theme>
@@ -20203,7 +19798,7 @@
   <a:extraClrSchemeLst/>
   <a:extLst>
     <a:ext uri="{05A4C25C-085E-4340-85A3-A5531E510DB2}">
-      <thm15:themeFamily xmlns:thm15="http://schemas.microsoft.com/office/thememl/2012/main" name="Office Theme" id="{62F939B6-93AF-4DB8-9C6B-D6C7DFDC589F}" vid="{4A3C46E8-61CC-4603-A589-7422A47A8E4A}"/>
+      <thm15:themeFamily xmlns:thm15="http://schemas.microsoft.com/office/thememl/2012/main" xmlns="" name="Office Theme" id="{62F939B6-93AF-4DB8-9C6B-D6C7DFDC589F}" vid="{4A3C46E8-61CC-4603-A589-7422A47A8E4A}"/>
     </a:ext>
   </a:extLst>
 </a:theme>
@@ -20464,19 +20059,25 @@
   <a:extraClrSchemeLst/>
   <a:extLst>
     <a:ext uri="{05A4C25C-085E-4340-85A3-A5531E510DB2}">
-      <thm15:themeFamily xmlns:thm15="http://schemas.microsoft.com/office/thememl/2012/main" name="Office Theme" id="{62F939B6-93AF-4DB8-9C6B-D6C7DFDC589F}" vid="{4A3C46E8-61CC-4603-A589-7422A47A8E4A}"/>
+      <thm15:themeFamily xmlns:thm15="http://schemas.microsoft.com/office/thememl/2012/main" xmlns="" name="Office Theme" id="{62F939B6-93AF-4DB8-9C6B-D6C7DFDC589F}" vid="{4A3C46E8-61CC-4603-A589-7422A47A8E4A}"/>
     </a:ext>
   </a:extLst>
 </a:theme>
 </file>
 
 <file path=customXml/item1.xml><?xml version="1.0" encoding="utf-8"?>
-<?mso-contentType ?>
-<FormTemplates xmlns="http://schemas.microsoft.com/sharepoint/v3/contenttype/forms">
-  <Display>DocumentLibraryForm</Display>
-  <Edit>DocumentLibraryForm</Edit>
-  <New>DocumentLibraryForm</New>
-</FormTemplates>
+<p:properties xmlns:p="http://schemas.microsoft.com/office/2006/metadata/properties" xmlns:xsi="http://www.w3.org/2001/XMLSchema-instance" xmlns:pc="http://schemas.microsoft.com/office/infopath/2007/PartnerControls">
+  <documentManagement>
+    <TaxCatchAll xmlns="a55c6545-c4b0-41ba-b65e-41037e7c803f"/>
+    <SharedWithUsers xmlns="b048c077-1ef5-43d8-8cbe-0087f6733556">
+      <UserInfo>
+        <DisplayName>Todos excepto los usuarios externos</DisplayName>
+        <AccountId>181</AccountId>
+        <AccountType/>
+      </UserInfo>
+    </SharedWithUsers>
+  </documentManagement>
+</p:properties>
 </file>
 
 <file path=customXml/item2.xml><?xml version="1.0" encoding="utf-8"?>
@@ -20651,24 +20252,27 @@
 </file>
 
 <file path=customXml/item3.xml><?xml version="1.0" encoding="utf-8"?>
-<p:properties xmlns:p="http://schemas.microsoft.com/office/2006/metadata/properties" xmlns:xsi="http://www.w3.org/2001/XMLSchema-instance" xmlns:pc="http://schemas.microsoft.com/office/infopath/2007/PartnerControls">
-  <documentManagement>
-    <TaxCatchAll xmlns="a55c6545-c4b0-41ba-b65e-41037e7c803f"/>
-    <SharedWithUsers xmlns="b048c077-1ef5-43d8-8cbe-0087f6733556">
-      <UserInfo>
-        <DisplayName>Todos excepto los usuarios externos</DisplayName>
-        <AccountId>181</AccountId>
-        <AccountType/>
-      </UserInfo>
-    </SharedWithUsers>
-  </documentManagement>
-</p:properties>
+<?mso-contentType ?>
+<FormTemplates xmlns="http://schemas.microsoft.com/sharepoint/v3/contenttype/forms">
+  <Display>DocumentLibraryForm</Display>
+  <Edit>DocumentLibraryForm</Edit>
+  <New>DocumentLibraryForm</New>
+</FormTemplates>
 </file>
 
 <file path=customXml/itemProps1.xml><?xml version="1.0" encoding="utf-8"?>
-<ds:datastoreItem xmlns:ds="http://schemas.openxmlformats.org/officeDocument/2006/customXml" ds:itemID="{5313EA09-C0DC-4015-ABE0-A5612D75F864}">
+<ds:datastoreItem xmlns:ds="http://schemas.openxmlformats.org/officeDocument/2006/customXml" ds:itemID="{6C60FA3A-4249-4D6E-A9A8-3B7219DF275B}">
   <ds:schemaRefs>
-    <ds:schemaRef ds:uri="http://schemas.microsoft.com/sharepoint/v3/contenttype/forms"/>
+    <ds:schemaRef ds:uri="http://schemas.microsoft.com/office/2006/documentManagement/types"/>
+    <ds:schemaRef ds:uri="a55c6545-c4b0-41ba-b65e-41037e7c803f"/>
+    <ds:schemaRef ds:uri="http://purl.org/dc/elements/1.1/"/>
+    <ds:schemaRef ds:uri="http://schemas.microsoft.com/office/2006/metadata/properties"/>
+    <ds:schemaRef ds:uri="b048c077-1ef5-43d8-8cbe-0087f6733556"/>
+    <ds:schemaRef ds:uri="http://purl.org/dc/terms/"/>
+    <ds:schemaRef ds:uri="http://schemas.microsoft.com/office/infopath/2007/PartnerControls"/>
+    <ds:schemaRef ds:uri="http://schemas.openxmlformats.org/package/2006/metadata/core-properties"/>
+    <ds:schemaRef ds:uri="http://www.w3.org/XML/1998/namespace"/>
+    <ds:schemaRef ds:uri="http://purl.org/dc/dcmitype/"/>
   </ds:schemaRefs>
 </ds:datastoreItem>
 </file>
@@ -20693,18 +20297,9 @@
 </file>
 
 <file path=customXml/itemProps3.xml><?xml version="1.0" encoding="utf-8"?>
-<ds:datastoreItem xmlns:ds="http://schemas.openxmlformats.org/officeDocument/2006/customXml" ds:itemID="{6C60FA3A-4249-4D6E-A9A8-3B7219DF275B}">
+<ds:datastoreItem xmlns:ds="http://schemas.openxmlformats.org/officeDocument/2006/customXml" ds:itemID="{5313EA09-C0DC-4015-ABE0-A5612D75F864}">
   <ds:schemaRefs>
-    <ds:schemaRef ds:uri="http://schemas.microsoft.com/office/2006/documentManagement/types"/>
-    <ds:schemaRef ds:uri="a55c6545-c4b0-41ba-b65e-41037e7c803f"/>
-    <ds:schemaRef ds:uri="http://purl.org/dc/elements/1.1/"/>
-    <ds:schemaRef ds:uri="http://schemas.microsoft.com/office/2006/metadata/properties"/>
-    <ds:schemaRef ds:uri="b048c077-1ef5-43d8-8cbe-0087f6733556"/>
-    <ds:schemaRef ds:uri="http://purl.org/dc/terms/"/>
-    <ds:schemaRef ds:uri="http://schemas.microsoft.com/office/infopath/2007/PartnerControls"/>
-    <ds:schemaRef ds:uri="http://schemas.openxmlformats.org/package/2006/metadata/core-properties"/>
-    <ds:schemaRef ds:uri="http://www.w3.org/XML/1998/namespace"/>
-    <ds:schemaRef ds:uri="http://purl.org/dc/dcmitype/"/>
+    <ds:schemaRef ds:uri="http://schemas.microsoft.com/sharepoint/v3/contenttype/forms"/>
   </ds:schemaRefs>
 </ds:datastoreItem>
 </file>
</xml_diff>

<commit_message>
Add jasmine standalone tests
</commit_message>
<xml_diff>
--- a/resume.pptx
+++ b/resume.pptx
@@ -12,10 +12,10 @@
     <p:sldMasterId id="2147483696" r:id="rId11"/>
   </p:sldMasterIdLst>
   <p:notesMasterIdLst>
-    <p:notesMasterId r:id="rId28"/>
+    <p:notesMasterId r:id="rId29"/>
   </p:notesMasterIdLst>
   <p:handoutMasterIdLst>
-    <p:handoutMasterId r:id="rId29"/>
+    <p:handoutMasterId r:id="rId30"/>
   </p:handoutMasterIdLst>
   <p:sldIdLst>
     <p:sldId id="256" r:id="rId12"/>
@@ -33,7 +33,8 @@
     <p:sldId id="291" r:id="rId24"/>
     <p:sldId id="290" r:id="rId25"/>
     <p:sldId id="292" r:id="rId26"/>
-    <p:sldId id="272" r:id="rId27"/>
+    <p:sldId id="296" r:id="rId27"/>
+    <p:sldId id="272" r:id="rId28"/>
   </p:sldIdLst>
   <p:sldSz cx="12192000" cy="6858000"/>
   <p:notesSz cx="6858000" cy="9144000"/>
@@ -134,7 +135,7 @@
   </p:defaultTextStyle>
   <p:extLst>
     <p:ext uri="{EFAFB233-063F-42B5-8137-9DF3F51BA10A}">
-      <p15:sldGuideLst xmlns:p15="http://schemas.microsoft.com/office/powerpoint/2012/main">
+      <p15:sldGuideLst xmlns:p15="http://schemas.microsoft.com/office/powerpoint/2012/main" xmlns="">
         <p15:guide id="1" orient="horz" pos="2160">
           <p15:clr>
             <a:srgbClr val="A4A3A4"/>
@@ -148,7 +149,7 @@
       </p15:sldGuideLst>
     </p:ext>
     <p:ext uri="{2D200454-40CA-4A62-9FC3-DE9A4176ACB9}">
-      <p15:notesGuideLst xmlns:p15="http://schemas.microsoft.com/office/powerpoint/2012/main"/>
+      <p15:notesGuideLst xmlns:p15="http://schemas.microsoft.com/office/powerpoint/2012/main" xmlns=""/>
     </p:ext>
   </p:extLst>
 </p:presentation>
@@ -1204,6 +1205,13 @@
         </dgm:presLayoutVars>
       </dgm:prSet>
       <dgm:spPr/>
+      <dgm:t>
+        <a:bodyPr/>
+        <a:lstStyle/>
+        <a:p>
+          <a:endParaRPr lang="en-US"/>
+        </a:p>
+      </dgm:t>
     </dgm:pt>
     <dgm:pt modelId="{98B0D8FA-33BD-482B-B6F4-3F5E0198F6C8}" type="pres">
       <dgm:prSet presAssocID="{FA16F164-7E64-4B90-A525-8E0B2A2DD444}" presName="sibTrans" presStyleCnt="0"/>
@@ -1216,6 +1224,13 @@
         </dgm:presLayoutVars>
       </dgm:prSet>
       <dgm:spPr/>
+      <dgm:t>
+        <a:bodyPr/>
+        <a:lstStyle/>
+        <a:p>
+          <a:endParaRPr lang="en-US"/>
+        </a:p>
+      </dgm:t>
     </dgm:pt>
     <dgm:pt modelId="{051DD4FC-166F-4F02-A39E-A452BC910E06}" type="pres">
       <dgm:prSet presAssocID="{55DCBB83-7C6D-46A7-82CA-027E0B477E95}" presName="sibTrans" presStyleCnt="0"/>
@@ -1228,6 +1243,13 @@
         </dgm:presLayoutVars>
       </dgm:prSet>
       <dgm:spPr/>
+      <dgm:t>
+        <a:bodyPr/>
+        <a:lstStyle/>
+        <a:p>
+          <a:endParaRPr lang="en-US"/>
+        </a:p>
+      </dgm:t>
     </dgm:pt>
     <dgm:pt modelId="{77643FC8-7395-470F-A138-D10FAD0F0C7F}" type="pres">
       <dgm:prSet presAssocID="{C9026DD8-2164-4B97-A10F-513BD9C5AE66}" presName="sibTrans" presStyleCnt="0"/>
@@ -1240,6 +1262,13 @@
         </dgm:presLayoutVars>
       </dgm:prSet>
       <dgm:spPr/>
+      <dgm:t>
+        <a:bodyPr/>
+        <a:lstStyle/>
+        <a:p>
+          <a:endParaRPr lang="en-US"/>
+        </a:p>
+      </dgm:t>
     </dgm:pt>
   </dgm:ptLst>
   <dgm:cxnLst>
@@ -1280,454 +1309,6 @@
       <dsp:cNvGrpSpPr/>
     </dsp:nvGrpSpPr>
     <dsp:grpSpPr/>
-    <dsp:sp modelId="{C19FBA30-382B-44E2-8C1D-137A6F897C28}">
-      <dsp:nvSpPr>
-        <dsp:cNvPr id="0" name=""/>
-        <dsp:cNvSpPr/>
-      </dsp:nvSpPr>
-      <dsp:spPr>
-        <a:xfrm>
-          <a:off x="619648" y="0"/>
-          <a:ext cx="7022680" cy="2448272"/>
-        </a:xfrm>
-        <a:prstGeom prst="rightArrow">
-          <a:avLst/>
-        </a:prstGeom>
-        <a:solidFill>
-          <a:schemeClr val="accent3">
-            <a:tint val="40000"/>
-            <a:hueOff val="0"/>
-            <a:satOff val="0"/>
-            <a:lumOff val="0"/>
-            <a:alphaOff val="0"/>
-          </a:schemeClr>
-        </a:solidFill>
-        <a:ln>
-          <a:noFill/>
-        </a:ln>
-        <a:effectLst/>
-      </dsp:spPr>
-      <dsp:style>
-        <a:lnRef idx="0">
-          <a:scrgbClr r="0" g="0" b="0"/>
-        </a:lnRef>
-        <a:fillRef idx="1">
-          <a:scrgbClr r="0" g="0" b="0"/>
-        </a:fillRef>
-        <a:effectRef idx="2">
-          <a:scrgbClr r="0" g="0" b="0"/>
-        </a:effectRef>
-        <a:fontRef idx="minor"/>
-      </dsp:style>
-    </dsp:sp>
-    <dsp:sp modelId="{3BE67301-9880-4FEC-99F7-88569348EA0D}">
-      <dsp:nvSpPr>
-        <dsp:cNvPr id="0" name=""/>
-        <dsp:cNvSpPr/>
-      </dsp:nvSpPr>
-      <dsp:spPr>
-        <a:xfrm>
-          <a:off x="2823" y="734481"/>
-          <a:ext cx="1834739" cy="979308"/>
-        </a:xfrm>
-        <a:prstGeom prst="roundRect">
-          <a:avLst/>
-        </a:prstGeom>
-        <a:gradFill rotWithShape="0">
-          <a:gsLst>
-            <a:gs pos="0">
-              <a:schemeClr val="accent3">
-                <a:shade val="80000"/>
-                <a:hueOff val="0"/>
-                <a:satOff val="0"/>
-                <a:lumOff val="0"/>
-                <a:alphaOff val="0"/>
-                <a:satMod val="103000"/>
-                <a:lumMod val="102000"/>
-                <a:tint val="94000"/>
-              </a:schemeClr>
-            </a:gs>
-            <a:gs pos="50000">
-              <a:schemeClr val="accent3">
-                <a:shade val="80000"/>
-                <a:hueOff val="0"/>
-                <a:satOff val="0"/>
-                <a:lumOff val="0"/>
-                <a:alphaOff val="0"/>
-                <a:satMod val="110000"/>
-                <a:lumMod val="100000"/>
-                <a:shade val="100000"/>
-              </a:schemeClr>
-            </a:gs>
-            <a:gs pos="100000">
-              <a:schemeClr val="accent3">
-                <a:shade val="80000"/>
-                <a:hueOff val="0"/>
-                <a:satOff val="0"/>
-                <a:lumOff val="0"/>
-                <a:alphaOff val="0"/>
-                <a:lumMod val="99000"/>
-                <a:satMod val="120000"/>
-                <a:shade val="78000"/>
-              </a:schemeClr>
-            </a:gs>
-          </a:gsLst>
-          <a:lin ang="5400000" scaled="0"/>
-        </a:gradFill>
-        <a:ln>
-          <a:noFill/>
-        </a:ln>
-        <a:effectLst/>
-      </dsp:spPr>
-      <dsp:style>
-        <a:lnRef idx="0">
-          <a:scrgbClr r="0" g="0" b="0"/>
-        </a:lnRef>
-        <a:fillRef idx="3">
-          <a:scrgbClr r="0" g="0" b="0"/>
-        </a:fillRef>
-        <a:effectRef idx="2">
-          <a:scrgbClr r="0" g="0" b="0"/>
-        </a:effectRef>
-        <a:fontRef idx="minor">
-          <a:schemeClr val="lt1"/>
-        </a:fontRef>
-      </dsp:style>
-      <dsp:txBody>
-        <a:bodyPr spcFirstLastPara="0" vert="horz" wrap="square" lIns="76200" tIns="76200" rIns="76200" bIns="76200" numCol="1" spcCol="1270" anchor="ctr" anchorCtr="0">
-          <a:noAutofit/>
-        </a:bodyPr>
-        <a:lstStyle/>
-        <a:p>
-          <a:pPr marL="0" lvl="0" indent="0" algn="ctr" defTabSz="889000">
-            <a:lnSpc>
-              <a:spcPct val="90000"/>
-            </a:lnSpc>
-            <a:spcBef>
-              <a:spcPct val="0"/>
-            </a:spcBef>
-            <a:spcAft>
-              <a:spcPct val="35000"/>
-            </a:spcAft>
-            <a:buNone/>
-          </a:pPr>
-          <a:r>
-            <a:rPr lang="es-ES" sz="2000" kern="1200" dirty="0"/>
-            <a:t>SPRINT 1</a:t>
-          </a:r>
-        </a:p>
-      </dsp:txBody>
-      <dsp:txXfrm>
-        <a:off x="50629" y="782287"/>
-        <a:ext cx="1739127" cy="883696"/>
-      </dsp:txXfrm>
-    </dsp:sp>
-    <dsp:sp modelId="{41F7C86B-E9DC-4364-8A2B-DD3371CBF3D3}">
-      <dsp:nvSpPr>
-        <dsp:cNvPr id="0" name=""/>
-        <dsp:cNvSpPr/>
-      </dsp:nvSpPr>
-      <dsp:spPr>
-        <a:xfrm>
-          <a:off x="2143353" y="734481"/>
-          <a:ext cx="1834739" cy="979308"/>
-        </a:xfrm>
-        <a:prstGeom prst="roundRect">
-          <a:avLst/>
-        </a:prstGeom>
-        <a:gradFill rotWithShape="0">
-          <a:gsLst>
-            <a:gs pos="0">
-              <a:schemeClr val="accent3">
-                <a:shade val="80000"/>
-                <a:hueOff val="0"/>
-                <a:satOff val="0"/>
-                <a:lumOff val="6364"/>
-                <a:alphaOff val="0"/>
-                <a:satMod val="103000"/>
-                <a:lumMod val="102000"/>
-                <a:tint val="94000"/>
-              </a:schemeClr>
-            </a:gs>
-            <a:gs pos="50000">
-              <a:schemeClr val="accent3">
-                <a:shade val="80000"/>
-                <a:hueOff val="0"/>
-                <a:satOff val="0"/>
-                <a:lumOff val="6364"/>
-                <a:alphaOff val="0"/>
-                <a:satMod val="110000"/>
-                <a:lumMod val="100000"/>
-                <a:shade val="100000"/>
-              </a:schemeClr>
-            </a:gs>
-            <a:gs pos="100000">
-              <a:schemeClr val="accent3">
-                <a:shade val="80000"/>
-                <a:hueOff val="0"/>
-                <a:satOff val="0"/>
-                <a:lumOff val="6364"/>
-                <a:alphaOff val="0"/>
-                <a:lumMod val="99000"/>
-                <a:satMod val="120000"/>
-                <a:shade val="78000"/>
-              </a:schemeClr>
-            </a:gs>
-          </a:gsLst>
-          <a:lin ang="5400000" scaled="0"/>
-        </a:gradFill>
-        <a:ln>
-          <a:noFill/>
-        </a:ln>
-        <a:effectLst/>
-      </dsp:spPr>
-      <dsp:style>
-        <a:lnRef idx="0">
-          <a:scrgbClr r="0" g="0" b="0"/>
-        </a:lnRef>
-        <a:fillRef idx="3">
-          <a:scrgbClr r="0" g="0" b="0"/>
-        </a:fillRef>
-        <a:effectRef idx="2">
-          <a:scrgbClr r="0" g="0" b="0"/>
-        </a:effectRef>
-        <a:fontRef idx="minor">
-          <a:schemeClr val="lt1"/>
-        </a:fontRef>
-      </dsp:style>
-      <dsp:txBody>
-        <a:bodyPr spcFirstLastPara="0" vert="horz" wrap="square" lIns="76200" tIns="76200" rIns="76200" bIns="76200" numCol="1" spcCol="1270" anchor="ctr" anchorCtr="0">
-          <a:noAutofit/>
-        </a:bodyPr>
-        <a:lstStyle/>
-        <a:p>
-          <a:pPr marL="0" lvl="0" indent="0" algn="ctr" defTabSz="889000">
-            <a:lnSpc>
-              <a:spcPct val="90000"/>
-            </a:lnSpc>
-            <a:spcBef>
-              <a:spcPct val="0"/>
-            </a:spcBef>
-            <a:spcAft>
-              <a:spcPct val="35000"/>
-            </a:spcAft>
-            <a:buNone/>
-          </a:pPr>
-          <a:r>
-            <a:rPr lang="es-ES" sz="2000" kern="1200" dirty="0"/>
-            <a:t>SPRINT 2</a:t>
-          </a:r>
-        </a:p>
-      </dsp:txBody>
-      <dsp:txXfrm>
-        <a:off x="2191159" y="782287"/>
-        <a:ext cx="1739127" cy="883696"/>
-      </dsp:txXfrm>
-    </dsp:sp>
-    <dsp:sp modelId="{4BAD5466-94E1-47CA-9FAA-DDD3B7595BCC}">
-      <dsp:nvSpPr>
-        <dsp:cNvPr id="0" name=""/>
-        <dsp:cNvSpPr/>
-      </dsp:nvSpPr>
-      <dsp:spPr>
-        <a:xfrm>
-          <a:off x="4283883" y="734481"/>
-          <a:ext cx="1834739" cy="979308"/>
-        </a:xfrm>
-        <a:prstGeom prst="roundRect">
-          <a:avLst/>
-        </a:prstGeom>
-        <a:gradFill rotWithShape="0">
-          <a:gsLst>
-            <a:gs pos="0">
-              <a:schemeClr val="accent3">
-                <a:shade val="80000"/>
-                <a:hueOff val="0"/>
-                <a:satOff val="0"/>
-                <a:lumOff val="12728"/>
-                <a:alphaOff val="0"/>
-                <a:satMod val="103000"/>
-                <a:lumMod val="102000"/>
-                <a:tint val="94000"/>
-              </a:schemeClr>
-            </a:gs>
-            <a:gs pos="50000">
-              <a:schemeClr val="accent3">
-                <a:shade val="80000"/>
-                <a:hueOff val="0"/>
-                <a:satOff val="0"/>
-                <a:lumOff val="12728"/>
-                <a:alphaOff val="0"/>
-                <a:satMod val="110000"/>
-                <a:lumMod val="100000"/>
-                <a:shade val="100000"/>
-              </a:schemeClr>
-            </a:gs>
-            <a:gs pos="100000">
-              <a:schemeClr val="accent3">
-                <a:shade val="80000"/>
-                <a:hueOff val="0"/>
-                <a:satOff val="0"/>
-                <a:lumOff val="12728"/>
-                <a:alphaOff val="0"/>
-                <a:lumMod val="99000"/>
-                <a:satMod val="120000"/>
-                <a:shade val="78000"/>
-              </a:schemeClr>
-            </a:gs>
-          </a:gsLst>
-          <a:lin ang="5400000" scaled="0"/>
-        </a:gradFill>
-        <a:ln>
-          <a:noFill/>
-        </a:ln>
-        <a:effectLst/>
-      </dsp:spPr>
-      <dsp:style>
-        <a:lnRef idx="0">
-          <a:scrgbClr r="0" g="0" b="0"/>
-        </a:lnRef>
-        <a:fillRef idx="3">
-          <a:scrgbClr r="0" g="0" b="0"/>
-        </a:fillRef>
-        <a:effectRef idx="2">
-          <a:scrgbClr r="0" g="0" b="0"/>
-        </a:effectRef>
-        <a:fontRef idx="minor">
-          <a:schemeClr val="lt1"/>
-        </a:fontRef>
-      </dsp:style>
-      <dsp:txBody>
-        <a:bodyPr spcFirstLastPara="0" vert="horz" wrap="square" lIns="76200" tIns="76200" rIns="76200" bIns="76200" numCol="1" spcCol="1270" anchor="ctr" anchorCtr="0">
-          <a:noAutofit/>
-        </a:bodyPr>
-        <a:lstStyle/>
-        <a:p>
-          <a:pPr marL="0" lvl="0" indent="0" algn="ctr" defTabSz="889000">
-            <a:lnSpc>
-              <a:spcPct val="90000"/>
-            </a:lnSpc>
-            <a:spcBef>
-              <a:spcPct val="0"/>
-            </a:spcBef>
-            <a:spcAft>
-              <a:spcPct val="35000"/>
-            </a:spcAft>
-            <a:buNone/>
-          </a:pPr>
-          <a:r>
-            <a:rPr lang="es-ES" sz="2000" kern="1200" dirty="0"/>
-            <a:t>SPRINT…</a:t>
-          </a:r>
-        </a:p>
-      </dsp:txBody>
-      <dsp:txXfrm>
-        <a:off x="4331689" y="782287"/>
-        <a:ext cx="1739127" cy="883696"/>
-      </dsp:txXfrm>
-    </dsp:sp>
-    <dsp:sp modelId="{467EE60E-61AA-427F-A830-D12F30BF2A28}">
-      <dsp:nvSpPr>
-        <dsp:cNvPr id="0" name=""/>
-        <dsp:cNvSpPr/>
-      </dsp:nvSpPr>
-      <dsp:spPr>
-        <a:xfrm>
-          <a:off x="6424413" y="734481"/>
-          <a:ext cx="1834739" cy="979308"/>
-        </a:xfrm>
-        <a:prstGeom prst="roundRect">
-          <a:avLst/>
-        </a:prstGeom>
-        <a:gradFill rotWithShape="0">
-          <a:gsLst>
-            <a:gs pos="0">
-              <a:schemeClr val="accent3">
-                <a:shade val="80000"/>
-                <a:hueOff val="0"/>
-                <a:satOff val="0"/>
-                <a:lumOff val="19092"/>
-                <a:alphaOff val="0"/>
-                <a:satMod val="103000"/>
-                <a:lumMod val="102000"/>
-                <a:tint val="94000"/>
-              </a:schemeClr>
-            </a:gs>
-            <a:gs pos="50000">
-              <a:schemeClr val="accent3">
-                <a:shade val="80000"/>
-                <a:hueOff val="0"/>
-                <a:satOff val="0"/>
-                <a:lumOff val="19092"/>
-                <a:alphaOff val="0"/>
-                <a:satMod val="110000"/>
-                <a:lumMod val="100000"/>
-                <a:shade val="100000"/>
-              </a:schemeClr>
-            </a:gs>
-            <a:gs pos="100000">
-              <a:schemeClr val="accent3">
-                <a:shade val="80000"/>
-                <a:hueOff val="0"/>
-                <a:satOff val="0"/>
-                <a:lumOff val="19092"/>
-                <a:alphaOff val="0"/>
-                <a:lumMod val="99000"/>
-                <a:satMod val="120000"/>
-                <a:shade val="78000"/>
-              </a:schemeClr>
-            </a:gs>
-          </a:gsLst>
-          <a:lin ang="5400000" scaled="0"/>
-        </a:gradFill>
-        <a:ln>
-          <a:noFill/>
-        </a:ln>
-        <a:effectLst/>
-      </dsp:spPr>
-      <dsp:style>
-        <a:lnRef idx="0">
-          <a:scrgbClr r="0" g="0" b="0"/>
-        </a:lnRef>
-        <a:fillRef idx="3">
-          <a:scrgbClr r="0" g="0" b="0"/>
-        </a:fillRef>
-        <a:effectRef idx="2">
-          <a:scrgbClr r="0" g="0" b="0"/>
-        </a:effectRef>
-        <a:fontRef idx="minor">
-          <a:schemeClr val="lt1"/>
-        </a:fontRef>
-      </dsp:style>
-      <dsp:txBody>
-        <a:bodyPr spcFirstLastPara="0" vert="horz" wrap="square" lIns="76200" tIns="76200" rIns="76200" bIns="76200" numCol="1" spcCol="1270" anchor="ctr" anchorCtr="0">
-          <a:noAutofit/>
-        </a:bodyPr>
-        <a:lstStyle/>
-        <a:p>
-          <a:pPr marL="0" lvl="0" indent="0" algn="ctr" defTabSz="889000">
-            <a:lnSpc>
-              <a:spcPct val="90000"/>
-            </a:lnSpc>
-            <a:spcBef>
-              <a:spcPct val="0"/>
-            </a:spcBef>
-            <a:spcAft>
-              <a:spcPct val="35000"/>
-            </a:spcAft>
-            <a:buNone/>
-          </a:pPr>
-          <a:r>
-            <a:rPr lang="es-ES" sz="2000" kern="1200" dirty="0"/>
-            <a:t>SPRINT N</a:t>
-          </a:r>
-        </a:p>
-      </dsp:txBody>
-      <dsp:txXfrm>
-        <a:off x="6472219" y="782287"/>
-        <a:ext cx="1739127" cy="883696"/>
-      </dsp:txXfrm>
-    </dsp:sp>
   </dsp:spTree>
 </dsp:drawing>
 </file>
@@ -3002,7 +2583,7 @@
           <a:p>
             <a:fld id="{1524C607-EC43-4D45-819C-01ED569A62A9}" type="datetimeFigureOut">
               <a:rPr lang="es-ES_tradnl" smtClean="0"/>
-              <a:t>13/06/2016</a:t>
+              <a:t>14/06/2016</a:t>
             </a:fld>
             <a:endParaRPr lang="es-ES_tradnl" dirty="0"/>
           </a:p>
@@ -3068,7 +2649,7 @@
           <a:p>
             <a:fld id="{22FF3C80-5006-4947-B2EA-4A4A50684FF5}" type="slidenum">
               <a:rPr lang="es-ES_tradnl" smtClean="0"/>
-              <a:t>‹Nº›</a:t>
+              <a:t>‹#›</a:t>
             </a:fld>
             <a:endParaRPr lang="es-ES_tradnl" dirty="0"/>
           </a:p>
@@ -3167,7 +2748,7 @@
           <a:p>
             <a:fld id="{26D2F09D-BAE4-494B-8CCF-2A216F98B43B}" type="datetimeFigureOut">
               <a:rPr lang="es-ES_tradnl" smtClean="0"/>
-              <a:t>13/06/2016</a:t>
+              <a:t>14/06/2016</a:t>
             </a:fld>
             <a:endParaRPr lang="es-ES_tradnl" dirty="0"/>
           </a:p>
@@ -3326,7 +2907,7 @@
           <a:p>
             <a:fld id="{2062F163-3063-474E-9A8A-E961A784F045}" type="slidenum">
               <a:rPr lang="es-ES_tradnl" smtClean="0"/>
-              <a:t>‹Nº›</a:t>
+              <a:t>‹#›</a:t>
             </a:fld>
             <a:endParaRPr lang="es-ES_tradnl" dirty="0"/>
           </a:p>
@@ -15842,7 +15423,7 @@
         <p:spPr>
           <a:xfrm>
             <a:off x="1232647" y="1690688"/>
-            <a:ext cx="10291482" cy="3139321"/>
+            <a:ext cx="10291482" cy="3816429"/>
           </a:xfrm>
           <a:prstGeom prst="rect">
             <a:avLst/>
@@ -16024,28 +15605,80 @@
                 <a:latin typeface="Segoe UI Light" panose="020B0502040204020203" pitchFamily="34" charset="0"/>
                 <a:cs typeface="Segoe UI Light" panose="020B0502040204020203" pitchFamily="34" charset="0"/>
               </a:rPr>
-              <a:t> Browser-</a:t>
-            </a:r>
-            <a:r>
-              <a:rPr lang="es-ES" sz="2200" dirty="0" err="1">
+              <a:t> </a:t>
+            </a:r>
+            <a:r>
+              <a:rPr lang="es-ES" sz="2200" dirty="0" smtClean="0">
                 <a:latin typeface="Segoe UI Light" panose="020B0502040204020203" pitchFamily="34" charset="0"/>
                 <a:cs typeface="Segoe UI Light" panose="020B0502040204020203" pitchFamily="34" charset="0"/>
               </a:rPr>
-              <a:t>sync</a:t>
-            </a:r>
-            <a:r>
-              <a:rPr lang="es-ES" sz="2200" dirty="0">
+              <a:t>Browser-</a:t>
+            </a:r>
+            <a:r>
+              <a:rPr lang="es-ES" sz="2200" dirty="0" err="1" smtClean="0">
                 <a:latin typeface="Segoe UI Light" panose="020B0502040204020203" pitchFamily="34" charset="0"/>
                 <a:cs typeface="Segoe UI Light" panose="020B0502040204020203" pitchFamily="34" charset="0"/>
               </a:rPr>
-              <a:t>-</a:t>
-            </a:r>
-            <a:r>
-              <a:rPr lang="es-ES" sz="2200" dirty="0" err="1">
+              <a:t>sync</a:t>
+            </a:r>
+            <a:r>
+              <a:rPr lang="es-ES" sz="2200" dirty="0" smtClean="0">
                 <a:latin typeface="Segoe UI Light" panose="020B0502040204020203" pitchFamily="34" charset="0"/>
                 <a:cs typeface="Segoe UI Light" panose="020B0502040204020203" pitchFamily="34" charset="0"/>
               </a:rPr>
+              <a:t>-</a:t>
+            </a:r>
+            <a:r>
+              <a:rPr lang="es-ES" sz="2200" dirty="0" err="1" smtClean="0">
+                <a:latin typeface="Segoe UI Light" panose="020B0502040204020203" pitchFamily="34" charset="0"/>
+                <a:cs typeface="Segoe UI Light" panose="020B0502040204020203" pitchFamily="34" charset="0"/>
+              </a:rPr>
               <a:t>plugin</a:t>
+            </a:r>
+            <a:endParaRPr lang="es-ES" sz="2200" dirty="0" smtClean="0">
+              <a:latin typeface="Segoe UI Light" panose="020B0502040204020203" pitchFamily="34" charset="0"/>
+              <a:cs typeface="Segoe UI Light" panose="020B0502040204020203" pitchFamily="34" charset="0"/>
+            </a:endParaRPr>
+          </a:p>
+          <a:p>
+            <a:pPr marL="457200" indent="-457200">
+              <a:buFont typeface="+mj-lt"/>
+              <a:buAutoNum type="arabicPeriod"/>
+            </a:pPr>
+            <a:r>
+              <a:rPr lang="es-ES" sz="2200" dirty="0" err="1" smtClean="0">
+                <a:latin typeface="Segoe UI Light" panose="020B0502040204020203" pitchFamily="34" charset="0"/>
+                <a:cs typeface="Segoe UI Light" panose="020B0502040204020203" pitchFamily="34" charset="0"/>
+              </a:rPr>
+              <a:t>Add</a:t>
+            </a:r>
+            <a:r>
+              <a:rPr lang="es-ES" sz="2200" dirty="0" smtClean="0">
+                <a:latin typeface="Segoe UI Light" panose="020B0502040204020203" pitchFamily="34" charset="0"/>
+                <a:cs typeface="Segoe UI Light" panose="020B0502040204020203" pitchFamily="34" charset="0"/>
+              </a:rPr>
+              <a:t> </a:t>
+            </a:r>
+            <a:r>
+              <a:rPr lang="es-ES" sz="2200" dirty="0" err="1" smtClean="0">
+                <a:latin typeface="Segoe UI Light" panose="020B0502040204020203" pitchFamily="34" charset="0"/>
+                <a:cs typeface="Segoe UI Light" panose="020B0502040204020203" pitchFamily="34" charset="0"/>
+              </a:rPr>
+              <a:t>npm</a:t>
+            </a:r>
+            <a:r>
+              <a:rPr lang="es-ES" sz="2200" dirty="0" smtClean="0">
+                <a:latin typeface="Segoe UI Light" panose="020B0502040204020203" pitchFamily="34" charset="0"/>
+                <a:cs typeface="Segoe UI Light" panose="020B0502040204020203" pitchFamily="34" charset="0"/>
+              </a:rPr>
+              <a:t> script to </a:t>
+            </a:r>
+            <a:r>
+              <a:rPr lang="es-ES" sz="2200" dirty="0" err="1" smtClean="0">
+                <a:latin typeface="Segoe UI Light" panose="020B0502040204020203" pitchFamily="34" charset="0"/>
+                <a:cs typeface="Segoe UI Light" panose="020B0502040204020203" pitchFamily="34" charset="0"/>
+              </a:rPr>
+              <a:t>start</a:t>
             </a:r>
             <a:endParaRPr lang="es-ES" sz="2200" dirty="0">
               <a:latin typeface="Segoe UI Light" panose="020B0502040204020203" pitchFamily="34" charset="0"/>
@@ -16090,9 +15723,35 @@
               <a:rPr lang="en-US" sz="2200" dirty="0">
                 <a:latin typeface="Segoe UI Light" panose="020B0502040204020203" pitchFamily="34" charset="0"/>
                 <a:cs typeface="Segoe UI Light" panose="020B0502040204020203" pitchFamily="34" charset="0"/>
-              </a:rPr>
-              <a:t>https://www.npmjs.com/package/browser-sync-webpack-plugin</a:t>
-            </a:r>
+                <a:hlinkClick r:id="rId3"/>
+              </a:rPr>
+              <a:t>https://</a:t>
+            </a:r>
+            <a:r>
+              <a:rPr lang="en-US" sz="2200" dirty="0" smtClean="0">
+                <a:latin typeface="Segoe UI Light" panose="020B0502040204020203" pitchFamily="34" charset="0"/>
+                <a:cs typeface="Segoe UI Light" panose="020B0502040204020203" pitchFamily="34" charset="0"/>
+                <a:hlinkClick r:id="rId3"/>
+              </a:rPr>
+              <a:t>www.npmjs.com/package/browser-sync-webpack-plugin</a:t>
+            </a:r>
+            <a:endParaRPr lang="en-US" sz="2200" dirty="0" smtClean="0">
+              <a:latin typeface="Segoe UI Light" panose="020B0502040204020203" pitchFamily="34" charset="0"/>
+              <a:cs typeface="Segoe UI Light" panose="020B0502040204020203" pitchFamily="34" charset="0"/>
+            </a:endParaRPr>
+          </a:p>
+          <a:p>
+            <a:r>
+              <a:rPr lang="en-US" sz="2200" dirty="0">
+                <a:latin typeface="Segoe UI Light" panose="020B0502040204020203" pitchFamily="34" charset="0"/>
+                <a:cs typeface="Segoe UI Light" panose="020B0502040204020203" pitchFamily="34" charset="0"/>
+              </a:rPr>
+              <a:t>https://docs.npmjs.com/misc/scripts</a:t>
+            </a:r>
+            <a:endParaRPr lang="en-US" sz="2200" dirty="0">
+              <a:latin typeface="Segoe UI Light" panose="020B0502040204020203" pitchFamily="34" charset="0"/>
+              <a:cs typeface="Segoe UI Light" panose="020B0502040204020203" pitchFamily="34" charset="0"/>
+            </a:endParaRPr>
           </a:p>
           <a:p>
             <a:pPr marL="457200" indent="-457200">
@@ -16152,8 +15811,8 @@
           <a:lstStyle/>
           <a:p>
             <a:r>
-              <a:rPr lang="en-US"/>
-              <a:t>Using  Angular</a:t>
+              <a:rPr lang="en-US" dirty="0" smtClean="0"/>
+              <a:t>Angular</a:t>
             </a:r>
             <a:endParaRPr lang="en-US" dirty="0"/>
           </a:p>
@@ -16168,7 +15827,7 @@
         <p:spPr>
           <a:xfrm>
             <a:off x="1232647" y="1690688"/>
-            <a:ext cx="10291482" cy="1538883"/>
+            <a:ext cx="10291482" cy="2462213"/>
           </a:xfrm>
           <a:prstGeom prst="rect">
             <a:avLst/>
@@ -16180,75 +15839,88 @@
           </a:bodyPr>
           <a:lstStyle/>
           <a:p>
+            <a:pPr marL="342900" indent="-342900">
+              <a:buFont typeface="Arial" panose="020B0604020202020204" pitchFamily="34" charset="0"/>
+              <a:buChar char="•"/>
+            </a:pPr>
+            <a:r>
+              <a:rPr lang="en-US" sz="2200" dirty="0" smtClean="0">
+                <a:latin typeface="Segoe UI Light" panose="020B0502040204020203" pitchFamily="34" charset="0"/>
+                <a:cs typeface="Segoe UI Light" panose="020B0502040204020203" pitchFamily="34" charset="0"/>
+              </a:rPr>
+              <a:t>It is a structural framework for dynamic web apps</a:t>
+            </a:r>
+          </a:p>
+          <a:p>
+            <a:pPr marL="342900" indent="-342900">
+              <a:buFont typeface="Arial" panose="020B0604020202020204" pitchFamily="34" charset="0"/>
+              <a:buChar char="•"/>
+            </a:pPr>
+            <a:r>
+              <a:rPr lang="en-US" sz="2200" dirty="0" smtClean="0">
+                <a:latin typeface="Segoe UI Light" panose="020B0502040204020203" pitchFamily="34" charset="0"/>
+                <a:cs typeface="Segoe UI Light" panose="020B0502040204020203" pitchFamily="34" charset="0"/>
+              </a:rPr>
+              <a:t>It is focused in declarative programming over imperative programming</a:t>
+            </a:r>
+          </a:p>
+          <a:p>
+            <a:pPr marL="342900" indent="-342900">
+              <a:buFont typeface="Arial" panose="020B0604020202020204" pitchFamily="34" charset="0"/>
+              <a:buChar char="•"/>
+            </a:pPr>
+            <a:r>
+              <a:rPr lang="en-US" sz="2200" dirty="0" smtClean="0">
+                <a:latin typeface="Segoe UI Light" panose="020B0502040204020203" pitchFamily="34" charset="0"/>
+                <a:cs typeface="Segoe UI Light" panose="020B0502040204020203" pitchFamily="34" charset="0"/>
+              </a:rPr>
+              <a:t>Unit testing and dependency injection are core concepts</a:t>
+            </a:r>
+          </a:p>
+          <a:p>
+            <a:pPr marL="342900" indent="-342900">
+              <a:buFont typeface="Arial" panose="020B0604020202020204" pitchFamily="34" charset="0"/>
+              <a:buChar char="•"/>
+            </a:pPr>
+            <a:r>
+              <a:rPr lang="en-US" sz="2200" dirty="0" smtClean="0">
+                <a:latin typeface="Segoe UI Light" panose="020B0502040204020203" pitchFamily="34" charset="0"/>
+                <a:cs typeface="Segoe UI Light" panose="020B0502040204020203" pitchFamily="34" charset="0"/>
+              </a:rPr>
+              <a:t>It is switching from a MVW approach to a component based architecture</a:t>
+            </a:r>
+          </a:p>
+          <a:p>
+            <a:pPr marL="342900" indent="-342900">
+              <a:buFont typeface="Arial" panose="020B0604020202020204" pitchFamily="34" charset="0"/>
+              <a:buChar char="•"/>
+            </a:pPr>
+            <a:endParaRPr lang="es-ES" sz="2200" dirty="0" smtClean="0">
+              <a:latin typeface="Segoe UI Light" panose="020B0502040204020203" pitchFamily="34" charset="0"/>
+              <a:cs typeface="Segoe UI Light" panose="020B0502040204020203" pitchFamily="34" charset="0"/>
+            </a:endParaRPr>
+          </a:p>
+          <a:p>
             <a:r>
               <a:rPr lang="en-US" sz="2200" dirty="0">
                 <a:latin typeface="Segoe UI Light" panose="020B0502040204020203" pitchFamily="34" charset="0"/>
                 <a:cs typeface="Segoe UI Light" panose="020B0502040204020203" pitchFamily="34" charset="0"/>
               </a:rPr>
-              <a:t>Do Exercise 2.</a:t>
-            </a:r>
-          </a:p>
-          <a:p>
-            <a:pPr lvl="1"/>
-            <a:r>
-              <a:rPr lang="en-US" dirty="0">
+              <a:t>https://docs.angularjs.org/guide/introduction</a:t>
+            </a:r>
+          </a:p>
+          <a:p>
+            <a:r>
+              <a:rPr lang="en-US" sz="2200" dirty="0">
                 <a:latin typeface="Segoe UI Light" panose="020B0502040204020203" pitchFamily="34" charset="0"/>
                 <a:cs typeface="Segoe UI Light" panose="020B0502040204020203" pitchFamily="34" charset="0"/>
               </a:rPr>
-              <a:t>Modify Exercise 1 to use ECMAScript 6 syntax instead </a:t>
-            </a:r>
-            <a:r>
-              <a:rPr lang="en-US" dirty="0" err="1">
-                <a:latin typeface="Segoe UI Light" panose="020B0502040204020203" pitchFamily="34" charset="0"/>
-                <a:cs typeface="Segoe UI Light" panose="020B0502040204020203" pitchFamily="34" charset="0"/>
-              </a:rPr>
-              <a:t>requireJS</a:t>
-            </a:r>
-            <a:endParaRPr lang="en-US" dirty="0">
+              <a:t>https://docs.angularjs.org/guide/component </a:t>
+            </a:r>
+            <a:endParaRPr lang="en-US" sz="2200" dirty="0">
               <a:latin typeface="Segoe UI Light" panose="020B0502040204020203" pitchFamily="34" charset="0"/>
               <a:cs typeface="Segoe UI Light" panose="020B0502040204020203" pitchFamily="34" charset="0"/>
             </a:endParaRPr>
-          </a:p>
-          <a:p>
-            <a:pPr marL="742950" lvl="1" indent="-285750">
-              <a:buFont typeface="Arial" panose="020B0604020202020204" pitchFamily="34" charset="0"/>
-              <a:buChar char="•"/>
-            </a:pPr>
-            <a:r>
-              <a:rPr lang="en-US" dirty="0">
-                <a:latin typeface="Segoe UI Light" panose="020B0502040204020203" pitchFamily="34" charset="0"/>
-                <a:cs typeface="Segoe UI Light" panose="020B0502040204020203" pitchFamily="34" charset="0"/>
-              </a:rPr>
-              <a:t>Import</a:t>
-            </a:r>
-          </a:p>
-          <a:p>
-            <a:pPr lvl="1"/>
-            <a:r>
-              <a:rPr lang="en-US" dirty="0">
-                <a:latin typeface="Segoe UI Light" panose="020B0502040204020203" pitchFamily="34" charset="0"/>
-                <a:cs typeface="Segoe UI Light" panose="020B0502040204020203" pitchFamily="34" charset="0"/>
-              </a:rPr>
-              <a:t>As the not all the browsers support  ECMAScript 6 we have to translate it using Babel</a:t>
-            </a:r>
-          </a:p>
-          <a:p>
-            <a:pPr lvl="1"/>
-            <a:r>
-              <a:rPr lang="en-US" dirty="0">
-                <a:latin typeface="Segoe UI Light" panose="020B0502040204020203" pitchFamily="34" charset="0"/>
-                <a:cs typeface="Segoe UI Light" panose="020B0502040204020203" pitchFamily="34" charset="0"/>
-                <a:hlinkClick r:id="rId2"/>
-              </a:rPr>
-              <a:t>https://babeljs.io/docs/setup/#webpack</a:t>
-            </a:r>
-            <a:r>
-              <a:rPr lang="en-US" dirty="0">
-                <a:latin typeface="Segoe UI Light" panose="020B0502040204020203" pitchFamily="34" charset="0"/>
-                <a:cs typeface="Segoe UI Light" panose="020B0502040204020203" pitchFamily="34" charset="0"/>
-              </a:rPr>
-              <a:t> &amp; https://github.com/babel/babel-loader</a:t>
-            </a:r>
           </a:p>
         </p:txBody>
       </p:sp>
@@ -16262,6 +15934,13 @@
   <p:clrMapOvr>
     <a:masterClrMapping/>
   </p:clrMapOvr>
+  <p:timing>
+    <p:tnLst>
+      <p:par>
+        <p:cTn id="1" dur="indefinite" restart="never" nodeType="tmRoot"/>
+      </p:par>
+    </p:tnLst>
+  </p:timing>
 </p:sld>
 </file>
 
@@ -16298,9 +15977,10 @@
           <a:lstStyle/>
           <a:p>
             <a:r>
-              <a:rPr lang="en-US" dirty="0"/>
-              <a:t>Using  ES6 I</a:t>
-            </a:r>
+              <a:rPr lang="en-US" dirty="0" smtClean="0"/>
+              <a:t>Add angular</a:t>
+            </a:r>
+            <a:endParaRPr lang="en-US" dirty="0"/>
           </a:p>
         </p:txBody>
       </p:sp>
@@ -16313,7 +15993,7 @@
         <p:spPr>
           <a:xfrm>
             <a:off x="1232647" y="1690688"/>
-            <a:ext cx="10291482" cy="1538883"/>
+            <a:ext cx="10291482" cy="2092881"/>
           </a:xfrm>
           <a:prstGeom prst="rect">
             <a:avLst/>
@@ -16326,28 +16006,107 @@
           <a:lstStyle/>
           <a:p>
             <a:r>
-              <a:rPr lang="en-US" sz="2200" dirty="0">
+              <a:rPr lang="en-US" sz="2200" dirty="0" smtClean="0">
                 <a:latin typeface="Segoe UI Light" panose="020B0502040204020203" pitchFamily="34" charset="0"/>
                 <a:cs typeface="Segoe UI Light" panose="020B0502040204020203" pitchFamily="34" charset="0"/>
               </a:rPr>
-              <a:t>Do Exercise 2.</a:t>
-            </a:r>
-          </a:p>
-          <a:p>
-            <a:pPr lvl="1"/>
-            <a:r>
-              <a:rPr lang="en-US" dirty="0">
+              <a:t>Exercise 5. Add angular</a:t>
+            </a:r>
+          </a:p>
+          <a:p>
+            <a:pPr marL="742950" lvl="1" indent="-285750">
+              <a:buFont typeface="Arial" panose="020B0604020202020204" pitchFamily="34" charset="0"/>
+              <a:buChar char="•"/>
+            </a:pPr>
+            <a:r>
+              <a:rPr lang="en-US" dirty="0" smtClean="0">
                 <a:latin typeface="Segoe UI Light" panose="020B0502040204020203" pitchFamily="34" charset="0"/>
                 <a:cs typeface="Segoe UI Light" panose="020B0502040204020203" pitchFamily="34" charset="0"/>
               </a:rPr>
-              <a:t>Modify Exercise 1 to use ECMAScript 6 syntax instead </a:t>
-            </a:r>
-            <a:r>
-              <a:rPr lang="en-US" dirty="0" err="1">
+              <a:t>Install angular through </a:t>
+            </a:r>
+            <a:r>
+              <a:rPr lang="en-US" dirty="0" err="1" smtClean="0">
                 <a:latin typeface="Segoe UI Light" panose="020B0502040204020203" pitchFamily="34" charset="0"/>
                 <a:cs typeface="Segoe UI Light" panose="020B0502040204020203" pitchFamily="34" charset="0"/>
               </a:rPr>
-              <a:t>requireJS</a:t>
+              <a:t>npm</a:t>
+            </a:r>
+            <a:endParaRPr lang="en-US" dirty="0" smtClean="0">
+              <a:latin typeface="Segoe UI Light" panose="020B0502040204020203" pitchFamily="34" charset="0"/>
+              <a:cs typeface="Segoe UI Light" panose="020B0502040204020203" pitchFamily="34" charset="0"/>
+            </a:endParaRPr>
+          </a:p>
+          <a:p>
+            <a:pPr marL="742950" lvl="1" indent="-285750">
+              <a:buFont typeface="Arial" panose="020B0604020202020204" pitchFamily="34" charset="0"/>
+              <a:buChar char="•"/>
+            </a:pPr>
+            <a:r>
+              <a:rPr lang="en-US" dirty="0" smtClean="0">
+                <a:latin typeface="Segoe UI Light" panose="020B0502040204020203" pitchFamily="34" charset="0"/>
+                <a:cs typeface="Segoe UI Light" panose="020B0502040204020203" pitchFamily="34" charset="0"/>
+              </a:rPr>
+              <a:t>Import from </a:t>
+            </a:r>
+            <a:r>
+              <a:rPr lang="en-US" dirty="0" err="1" smtClean="0">
+                <a:latin typeface="Segoe UI Light" panose="020B0502040204020203" pitchFamily="34" charset="0"/>
+                <a:cs typeface="Segoe UI Light" panose="020B0502040204020203" pitchFamily="34" charset="0"/>
+              </a:rPr>
+              <a:t>index.ts</a:t>
+            </a:r>
+            <a:endParaRPr lang="en-US" dirty="0" smtClean="0">
+              <a:latin typeface="Segoe UI Light" panose="020B0502040204020203" pitchFamily="34" charset="0"/>
+              <a:cs typeface="Segoe UI Light" panose="020B0502040204020203" pitchFamily="34" charset="0"/>
+            </a:endParaRPr>
+          </a:p>
+          <a:p>
+            <a:pPr marL="742950" lvl="1" indent="-285750">
+              <a:buFont typeface="Arial" panose="020B0604020202020204" pitchFamily="34" charset="0"/>
+              <a:buChar char="•"/>
+            </a:pPr>
+            <a:r>
+              <a:rPr lang="en-US" dirty="0" smtClean="0">
+                <a:latin typeface="Segoe UI Light" panose="020B0502040204020203" pitchFamily="34" charset="0"/>
+                <a:cs typeface="Segoe UI Light" panose="020B0502040204020203" pitchFamily="34" charset="0"/>
+              </a:rPr>
+              <a:t>Modify </a:t>
+            </a:r>
+            <a:r>
+              <a:rPr lang="en-US" dirty="0" err="1" smtClean="0">
+                <a:latin typeface="Segoe UI Light" panose="020B0502040204020203" pitchFamily="34" charset="0"/>
+                <a:cs typeface="Segoe UI Light" panose="020B0502040204020203" pitchFamily="34" charset="0"/>
+              </a:rPr>
+              <a:t>webpack.config</a:t>
+            </a:r>
+            <a:r>
+              <a:rPr lang="en-US" dirty="0" smtClean="0">
+                <a:latin typeface="Segoe UI Light" panose="020B0502040204020203" pitchFamily="34" charset="0"/>
+                <a:cs typeface="Segoe UI Light" panose="020B0502040204020203" pitchFamily="34" charset="0"/>
+              </a:rPr>
+              <a:t> to add </a:t>
+            </a:r>
+            <a:r>
+              <a:rPr lang="en-US" dirty="0" err="1" smtClean="0">
+                <a:latin typeface="Segoe UI Light" panose="020B0502040204020203" pitchFamily="34" charset="0"/>
+                <a:cs typeface="Segoe UI Light" panose="020B0502040204020203" pitchFamily="34" charset="0"/>
+              </a:rPr>
+              <a:t>resolveloader</a:t>
+            </a:r>
+            <a:r>
+              <a:rPr lang="en-US" dirty="0" smtClean="0">
+                <a:latin typeface="Segoe UI Light" panose="020B0502040204020203" pitchFamily="34" charset="0"/>
+                <a:cs typeface="Segoe UI Light" panose="020B0502040204020203" pitchFamily="34" charset="0"/>
+              </a:rPr>
+              <a:t> through </a:t>
+            </a:r>
+            <a:r>
+              <a:rPr lang="en-US" dirty="0" err="1" smtClean="0">
+                <a:latin typeface="Segoe UI Light" panose="020B0502040204020203" pitchFamily="34" charset="0"/>
+                <a:cs typeface="Segoe UI Light" panose="020B0502040204020203" pitchFamily="34" charset="0"/>
+              </a:rPr>
+              <a:t>nodeModules</a:t>
             </a:r>
             <a:endParaRPr lang="en-US" dirty="0">
               <a:latin typeface="Segoe UI Light" panose="020B0502040204020203" pitchFamily="34" charset="0"/>
@@ -16355,44 +16114,112 @@
             </a:endParaRPr>
           </a:p>
           <a:p>
+            <a:r>
+              <a:rPr lang="en-US" dirty="0" err="1" smtClean="0">
+                <a:latin typeface="Segoe UI Light" panose="020B0502040204020203" pitchFamily="34" charset="0"/>
+                <a:cs typeface="Segoe UI Light" panose="020B0502040204020203" pitchFamily="34" charset="0"/>
+              </a:rPr>
+              <a:t>Instalar</a:t>
+            </a:r>
+            <a:r>
+              <a:rPr lang="en-US" dirty="0" smtClean="0">
+                <a:latin typeface="Segoe UI Light" panose="020B0502040204020203" pitchFamily="34" charset="0"/>
+                <a:cs typeface="Segoe UI Light" panose="020B0502040204020203" pitchFamily="34" charset="0"/>
+              </a:rPr>
+              <a:t> </a:t>
+            </a:r>
+            <a:r>
+              <a:rPr lang="en-US" dirty="0" err="1" smtClean="0">
+                <a:latin typeface="Segoe UI Light" panose="020B0502040204020203" pitchFamily="34" charset="0"/>
+                <a:cs typeface="Segoe UI Light" panose="020B0502040204020203" pitchFamily="34" charset="0"/>
+              </a:rPr>
+              <a:t>typings</a:t>
+            </a:r>
+            <a:endParaRPr lang="en-US" dirty="0" smtClean="0">
+              <a:latin typeface="Segoe UI Light" panose="020B0502040204020203" pitchFamily="34" charset="0"/>
+              <a:cs typeface="Segoe UI Light" panose="020B0502040204020203" pitchFamily="34" charset="0"/>
+            </a:endParaRPr>
+          </a:p>
+          <a:p>
             <a:pPr marL="742950" lvl="1" indent="-285750">
               <a:buFont typeface="Arial" panose="020B0604020202020204" pitchFamily="34" charset="0"/>
               <a:buChar char="•"/>
             </a:pPr>
             <a:r>
+              <a:rPr lang="en-US" dirty="0" err="1" smtClean="0">
+                <a:latin typeface="Segoe UI Light" panose="020B0502040204020203" pitchFamily="34" charset="0"/>
+                <a:cs typeface="Segoe UI Light" panose="020B0502040204020203" pitchFamily="34" charset="0"/>
+              </a:rPr>
+              <a:t>typings</a:t>
+            </a:r>
+            <a:r>
+              <a:rPr lang="en-US" dirty="0" smtClean="0">
+                <a:latin typeface="Segoe UI Light" panose="020B0502040204020203" pitchFamily="34" charset="0"/>
+                <a:cs typeface="Segoe UI Light" panose="020B0502040204020203" pitchFamily="34" charset="0"/>
+              </a:rPr>
+              <a:t> </a:t>
+            </a:r>
+            <a:r>
               <a:rPr lang="en-US" dirty="0">
                 <a:latin typeface="Segoe UI Light" panose="020B0502040204020203" pitchFamily="34" charset="0"/>
                 <a:cs typeface="Segoe UI Light" panose="020B0502040204020203" pitchFamily="34" charset="0"/>
               </a:rPr>
-              <a:t>Import</a:t>
-            </a:r>
-          </a:p>
-          <a:p>
-            <a:pPr lvl="1"/>
+              <a:t>install </a:t>
+            </a:r>
+            <a:r>
+              <a:rPr lang="en-US" dirty="0" err="1">
+                <a:latin typeface="Segoe UI Light" panose="020B0502040204020203" pitchFamily="34" charset="0"/>
+                <a:cs typeface="Segoe UI Light" panose="020B0502040204020203" pitchFamily="34" charset="0"/>
+              </a:rPr>
+              <a:t>dt~angular</a:t>
+            </a:r>
             <a:r>
               <a:rPr lang="en-US" dirty="0">
                 <a:latin typeface="Segoe UI Light" panose="020B0502040204020203" pitchFamily="34" charset="0"/>
                 <a:cs typeface="Segoe UI Light" panose="020B0502040204020203" pitchFamily="34" charset="0"/>
               </a:rPr>
-              <a:t>As the not all the browsers support  ECMAScript 6 we have to translate it using Babel</a:t>
-            </a:r>
-          </a:p>
-          <a:p>
-            <a:pPr lvl="1"/>
+              <a:t> --global --save</a:t>
+            </a:r>
+          </a:p>
+          <a:p>
+            <a:pPr marL="742950" lvl="1" indent="-285750">
+              <a:buFont typeface="Arial" panose="020B0604020202020204" pitchFamily="34" charset="0"/>
+              <a:buChar char="•"/>
+            </a:pPr>
+            <a:r>
+              <a:rPr lang="en-US" dirty="0" err="1" smtClean="0">
+                <a:latin typeface="Segoe UI Light" panose="020B0502040204020203" pitchFamily="34" charset="0"/>
+                <a:cs typeface="Segoe UI Light" panose="020B0502040204020203" pitchFamily="34" charset="0"/>
+              </a:rPr>
+              <a:t>typings</a:t>
+            </a:r>
+            <a:r>
+              <a:rPr lang="en-US" dirty="0" smtClean="0">
+                <a:latin typeface="Segoe UI Light" panose="020B0502040204020203" pitchFamily="34" charset="0"/>
+                <a:cs typeface="Segoe UI Light" panose="020B0502040204020203" pitchFamily="34" charset="0"/>
+              </a:rPr>
+              <a:t> </a:t>
+            </a:r>
             <a:r>
               <a:rPr lang="en-US" dirty="0">
                 <a:latin typeface="Segoe UI Light" panose="020B0502040204020203" pitchFamily="34" charset="0"/>
                 <a:cs typeface="Segoe UI Light" panose="020B0502040204020203" pitchFamily="34" charset="0"/>
-                <a:hlinkClick r:id="rId2"/>
-              </a:rPr>
-              <a:t>https://babeljs.io/docs/setup/#webpack</a:t>
+              </a:rPr>
+              <a:t>install </a:t>
+            </a:r>
+            <a:r>
+              <a:rPr lang="en-US" dirty="0" err="1">
+                <a:latin typeface="Segoe UI Light" panose="020B0502040204020203" pitchFamily="34" charset="0"/>
+                <a:cs typeface="Segoe UI Light" panose="020B0502040204020203" pitchFamily="34" charset="0"/>
+              </a:rPr>
+              <a:t>dt~jquery</a:t>
             </a:r>
             <a:r>
               <a:rPr lang="en-US" dirty="0">
                 <a:latin typeface="Segoe UI Light" panose="020B0502040204020203" pitchFamily="34" charset="0"/>
                 <a:cs typeface="Segoe UI Light" panose="020B0502040204020203" pitchFamily="34" charset="0"/>
               </a:rPr>
-              <a:t> &amp; https://github.com/babel/babel-loader</a:t>
+              <a:t> --global --save</a:t>
             </a:r>
           </a:p>
         </p:txBody>
@@ -16407,6 +16234,13 @@
   <p:clrMapOvr>
     <a:masterClrMapping/>
   </p:clrMapOvr>
+  <p:timing>
+    <p:tnLst>
+      <p:par>
+        <p:cTn id="1" dur="indefinite" restart="never" nodeType="tmRoot"/>
+      </p:par>
+    </p:tnLst>
+  </p:timing>
 </p:sld>
 </file>
 
@@ -16443,9 +16277,10 @@
           <a:lstStyle/>
           <a:p>
             <a:r>
-              <a:rPr lang="en-US" dirty="0"/>
-              <a:t>Using  ES6 I</a:t>
-            </a:r>
+              <a:rPr lang="es-ES" dirty="0" smtClean="0"/>
+              <a:t>Angular MVW</a:t>
+            </a:r>
+            <a:endParaRPr lang="en-US" dirty="0"/>
           </a:p>
         </p:txBody>
       </p:sp>
@@ -16458,7 +16293,7 @@
         <p:spPr>
           <a:xfrm>
             <a:off x="1232647" y="1690688"/>
-            <a:ext cx="10291482" cy="1538883"/>
+            <a:ext cx="10291482" cy="1785104"/>
           </a:xfrm>
           <a:prstGeom prst="rect">
             <a:avLst/>
@@ -16471,74 +16306,169 @@
           <a:lstStyle/>
           <a:p>
             <a:r>
+              <a:rPr lang="en-US" sz="2200" dirty="0" smtClean="0">
+                <a:latin typeface="Segoe UI Light" panose="020B0502040204020203" pitchFamily="34" charset="0"/>
+                <a:cs typeface="Segoe UI Light" panose="020B0502040204020203" pitchFamily="34" charset="0"/>
+              </a:rPr>
+              <a:t>Exercise </a:t>
+            </a:r>
+            <a:r>
               <a:rPr lang="en-US" sz="2200" dirty="0">
                 <a:latin typeface="Segoe UI Light" panose="020B0502040204020203" pitchFamily="34" charset="0"/>
                 <a:cs typeface="Segoe UI Light" panose="020B0502040204020203" pitchFamily="34" charset="0"/>
               </a:rPr>
-              <a:t>Do Exercise 2.</a:t>
-            </a:r>
-          </a:p>
-          <a:p>
-            <a:pPr lvl="1"/>
-            <a:r>
-              <a:rPr lang="en-US" dirty="0">
+              <a:t>6</a:t>
+            </a:r>
+            <a:r>
+              <a:rPr lang="en-US" sz="2200" dirty="0" smtClean="0">
                 <a:latin typeface="Segoe UI Light" panose="020B0502040204020203" pitchFamily="34" charset="0"/>
                 <a:cs typeface="Segoe UI Light" panose="020B0502040204020203" pitchFamily="34" charset="0"/>
               </a:rPr>
-              <a:t>Modify Exercise 1 to use ECMAScript 6 syntax instead </a:t>
-            </a:r>
-            <a:r>
-              <a:rPr lang="en-US" dirty="0" err="1">
+              <a:t>. Show a list of movies (</a:t>
+            </a:r>
+            <a:r>
+              <a:rPr lang="en-US" sz="2200" dirty="0" err="1" smtClean="0">
                 <a:latin typeface="Segoe UI Light" panose="020B0502040204020203" pitchFamily="34" charset="0"/>
                 <a:cs typeface="Segoe UI Light" panose="020B0502040204020203" pitchFamily="34" charset="0"/>
               </a:rPr>
-              <a:t>requireJS</a:t>
-            </a:r>
-            <a:endParaRPr lang="en-US" dirty="0">
+              <a:t>movies.json</a:t>
+            </a:r>
+            <a:r>
+              <a:rPr lang="en-US" sz="2200" dirty="0" smtClean="0">
+                <a:latin typeface="Segoe UI Light" panose="020B0502040204020203" pitchFamily="34" charset="0"/>
+                <a:cs typeface="Segoe UI Light" panose="020B0502040204020203" pitchFamily="34" charset="0"/>
+              </a:rPr>
+              <a:t>)</a:t>
+            </a:r>
+          </a:p>
+          <a:p>
+            <a:pPr marL="342900" indent="-342900">
+              <a:buFont typeface="Arial" panose="020B0604020202020204" pitchFamily="34" charset="0"/>
+              <a:buChar char="•"/>
+            </a:pPr>
+            <a:r>
+              <a:rPr lang="es-ES" sz="2200" dirty="0" smtClean="0">
+                <a:latin typeface="Segoe UI Light" panose="020B0502040204020203" pitchFamily="34" charset="0"/>
+                <a:cs typeface="Segoe UI Light" panose="020B0502040204020203" pitchFamily="34" charset="0"/>
+              </a:rPr>
+              <a:t>Use </a:t>
+            </a:r>
+            <a:r>
+              <a:rPr lang="es-ES" sz="2200" dirty="0" err="1" smtClean="0">
+                <a:latin typeface="Segoe UI Light" panose="020B0502040204020203" pitchFamily="34" charset="0"/>
+                <a:cs typeface="Segoe UI Light" panose="020B0502040204020203" pitchFamily="34" charset="0"/>
+              </a:rPr>
+              <a:t>controller</a:t>
+            </a:r>
+            <a:r>
+              <a:rPr lang="es-ES" sz="2200" dirty="0" smtClean="0">
+                <a:latin typeface="Segoe UI Light" panose="020B0502040204020203" pitchFamily="34" charset="0"/>
+                <a:cs typeface="Segoe UI Light" panose="020B0502040204020203" pitchFamily="34" charset="0"/>
+              </a:rPr>
+              <a:t> </a:t>
+            </a:r>
+            <a:r>
+              <a:rPr lang="es-ES" sz="2200" dirty="0" err="1" smtClean="0">
+                <a:latin typeface="Segoe UI Light" panose="020B0502040204020203" pitchFamily="34" charset="0"/>
+                <a:cs typeface="Segoe UI Light" panose="020B0502040204020203" pitchFamily="34" charset="0"/>
+              </a:rPr>
+              <a:t>syntax</a:t>
+            </a:r>
+            <a:r>
+              <a:rPr lang="es-ES" sz="2200" dirty="0">
+                <a:latin typeface="Segoe UI Light" panose="020B0502040204020203" pitchFamily="34" charset="0"/>
+                <a:cs typeface="Segoe UI Light" panose="020B0502040204020203" pitchFamily="34" charset="0"/>
+              </a:rPr>
+              <a:t>. </a:t>
+            </a:r>
+            <a:r>
+              <a:rPr lang="es-ES" sz="2200" dirty="0">
+                <a:latin typeface="Segoe UI Light" panose="020B0502040204020203" pitchFamily="34" charset="0"/>
+                <a:cs typeface="Segoe UI Light" panose="020B0502040204020203" pitchFamily="34" charset="0"/>
+                <a:hlinkClick r:id="rId2"/>
+              </a:rPr>
+              <a:t>https://</a:t>
+            </a:r>
+            <a:r>
+              <a:rPr lang="es-ES" sz="2200" dirty="0" smtClean="0">
+                <a:latin typeface="Segoe UI Light" panose="020B0502040204020203" pitchFamily="34" charset="0"/>
+                <a:cs typeface="Segoe UI Light" panose="020B0502040204020203" pitchFamily="34" charset="0"/>
+                <a:hlinkClick r:id="rId2"/>
+              </a:rPr>
+              <a:t>docs.angularjs.org/guide/controller</a:t>
+            </a:r>
+            <a:endParaRPr lang="es-ES" sz="2200" dirty="0" smtClean="0">
               <a:latin typeface="Segoe UI Light" panose="020B0502040204020203" pitchFamily="34" charset="0"/>
               <a:cs typeface="Segoe UI Light" panose="020B0502040204020203" pitchFamily="34" charset="0"/>
             </a:endParaRPr>
           </a:p>
           <a:p>
-            <a:pPr marL="742950" lvl="1" indent="-285750">
+            <a:pPr marL="342900" indent="-342900">
               <a:buFont typeface="Arial" panose="020B0604020202020204" pitchFamily="34" charset="0"/>
               <a:buChar char="•"/>
             </a:pPr>
             <a:r>
-              <a:rPr lang="en-US" dirty="0">
+              <a:rPr lang="es-ES" sz="2200" dirty="0" smtClean="0">
                 <a:latin typeface="Segoe UI Light" panose="020B0502040204020203" pitchFamily="34" charset="0"/>
                 <a:cs typeface="Segoe UI Light" panose="020B0502040204020203" pitchFamily="34" charset="0"/>
               </a:rPr>
-              <a:t>Import</a:t>
-            </a:r>
-          </a:p>
-          <a:p>
-            <a:pPr lvl="1"/>
-            <a:r>
-              <a:rPr lang="en-US" dirty="0">
+              <a:t>Use </a:t>
+            </a:r>
+            <a:r>
+              <a:rPr lang="es-ES" sz="2200" dirty="0" err="1" smtClean="0">
                 <a:latin typeface="Segoe UI Light" panose="020B0502040204020203" pitchFamily="34" charset="0"/>
                 <a:cs typeface="Segoe UI Light" panose="020B0502040204020203" pitchFamily="34" charset="0"/>
               </a:rPr>
-              <a:t>As the not all the browsers support  ECMAScript 6 we have to translate it using Babel</a:t>
-            </a:r>
-          </a:p>
-          <a:p>
-            <a:pPr lvl="1"/>
-            <a:r>
-              <a:rPr lang="en-US" dirty="0">
+              <a:t>ng-repeat</a:t>
+            </a:r>
+            <a:r>
+              <a:rPr lang="es-ES" sz="2200" dirty="0">
                 <a:latin typeface="Segoe UI Light" panose="020B0502040204020203" pitchFamily="34" charset="0"/>
                 <a:cs typeface="Segoe UI Light" panose="020B0502040204020203" pitchFamily="34" charset="0"/>
-                <a:hlinkClick r:id="rId2"/>
-              </a:rPr>
-              <a:t>https://babeljs.io/docs/setup/#webpack</a:t>
-            </a:r>
-            <a:r>
-              <a:rPr lang="en-US" dirty="0">
+              </a:rPr>
+              <a:t>. http://www.w3schools.com/angular/ng_ng-repeat.asp</a:t>
+            </a:r>
+            <a:endParaRPr lang="es-ES" sz="2200" dirty="0" smtClean="0">
+              <a:latin typeface="Segoe UI Light" panose="020B0502040204020203" pitchFamily="34" charset="0"/>
+              <a:cs typeface="Segoe UI Light" panose="020B0502040204020203" pitchFamily="34" charset="0"/>
+            </a:endParaRPr>
+          </a:p>
+          <a:p>
+            <a:pPr marL="342900" indent="-342900">
+              <a:buFont typeface="Arial" panose="020B0604020202020204" pitchFamily="34" charset="0"/>
+              <a:buChar char="•"/>
+            </a:pPr>
+            <a:r>
+              <a:rPr lang="es-ES" sz="2200" dirty="0" err="1" smtClean="0">
                 <a:latin typeface="Segoe UI Light" panose="020B0502040204020203" pitchFamily="34" charset="0"/>
                 <a:cs typeface="Segoe UI Light" panose="020B0502040204020203" pitchFamily="34" charset="0"/>
               </a:rPr>
-              <a:t> &amp; https://github.com/babel/babel-loader</a:t>
-            </a:r>
+              <a:t>Example</a:t>
+            </a:r>
+            <a:r>
+              <a:rPr lang="es-ES" sz="2200" dirty="0" smtClean="0">
+                <a:latin typeface="Segoe UI Light" panose="020B0502040204020203" pitchFamily="34" charset="0"/>
+                <a:cs typeface="Segoe UI Light" panose="020B0502040204020203" pitchFamily="34" charset="0"/>
+              </a:rPr>
+              <a:t>. http</a:t>
+            </a:r>
+            <a:r>
+              <a:rPr lang="es-ES" sz="2200" dirty="0">
+                <a:latin typeface="Segoe UI Light" panose="020B0502040204020203" pitchFamily="34" charset="0"/>
+                <a:cs typeface="Segoe UI Light" panose="020B0502040204020203" pitchFamily="34" charset="0"/>
+              </a:rPr>
+              <a:t>://jsfiddle.net/austinnoronha/RkykR/</a:t>
+            </a:r>
+            <a:endParaRPr lang="es-ES" sz="2200" dirty="0" smtClean="0">
+              <a:latin typeface="Segoe UI Light" panose="020B0502040204020203" pitchFamily="34" charset="0"/>
+              <a:cs typeface="Segoe UI Light" panose="020B0502040204020203" pitchFamily="34" charset="0"/>
+            </a:endParaRPr>
+          </a:p>
+          <a:p>
+            <a:endParaRPr lang="en-US" sz="2200" dirty="0">
+              <a:latin typeface="Segoe UI Light" panose="020B0502040204020203" pitchFamily="34" charset="0"/>
+              <a:cs typeface="Segoe UI Light" panose="020B0502040204020203" pitchFamily="34" charset="0"/>
+            </a:endParaRPr>
           </a:p>
         </p:txBody>
       </p:sp>
@@ -16552,6 +16482,13 @@
   <p:clrMapOvr>
     <a:masterClrMapping/>
   </p:clrMapOvr>
+  <p:timing>
+    <p:tnLst>
+      <p:par>
+        <p:cTn id="1" dur="indefinite" restart="never" nodeType="tmRoot"/>
+      </p:par>
+    </p:tnLst>
+  </p:timing>
 </p:sld>
 </file>
 
@@ -16588,9 +16525,10 @@
           <a:lstStyle/>
           <a:p>
             <a:r>
-              <a:rPr lang="en-US" dirty="0"/>
-              <a:t>Using  ES6 I</a:t>
-            </a:r>
+              <a:rPr lang="en-US" dirty="0" smtClean="0"/>
+              <a:t>Unit testing. Jasmine</a:t>
+            </a:r>
+            <a:endParaRPr lang="en-US" dirty="0"/>
           </a:p>
         </p:txBody>
       </p:sp>
@@ -16603,7 +16541,7 @@
         <p:spPr>
           <a:xfrm>
             <a:off x="1232647" y="1690688"/>
-            <a:ext cx="10291482" cy="1538883"/>
+            <a:ext cx="10291482" cy="1754326"/>
           </a:xfrm>
           <a:prstGeom prst="rect">
             <a:avLst/>
@@ -16615,75 +16553,143 @@
           </a:bodyPr>
           <a:lstStyle/>
           <a:p>
-            <a:r>
-              <a:rPr lang="en-US" sz="2200" dirty="0">
-                <a:latin typeface="Segoe UI Light" panose="020B0502040204020203" pitchFamily="34" charset="0"/>
-                <a:cs typeface="Segoe UI Light" panose="020B0502040204020203" pitchFamily="34" charset="0"/>
-              </a:rPr>
-              <a:t>Do Exercise 2.</a:t>
-            </a:r>
-          </a:p>
-          <a:p>
-            <a:pPr lvl="1"/>
+            <a:pPr marL="285750" indent="-285750">
+              <a:buFont typeface="Arial" panose="020B0604020202020204" pitchFamily="34" charset="0"/>
+              <a:buChar char="•"/>
+            </a:pPr>
             <a:r>
               <a:rPr lang="en-US" dirty="0">
                 <a:latin typeface="Segoe UI Light" panose="020B0502040204020203" pitchFamily="34" charset="0"/>
                 <a:cs typeface="Segoe UI Light" panose="020B0502040204020203" pitchFamily="34" charset="0"/>
               </a:rPr>
-              <a:t>Modify Exercise 1 to use ECMAScript 6 syntax instead </a:t>
-            </a:r>
-            <a:r>
-              <a:rPr lang="en-US" dirty="0" err="1">
+              <a:t>Unit testing is </a:t>
+            </a:r>
+            <a:r>
+              <a:rPr lang="en-US" dirty="0" smtClean="0">
                 <a:latin typeface="Segoe UI Light" panose="020B0502040204020203" pitchFamily="34" charset="0"/>
                 <a:cs typeface="Segoe UI Light" panose="020B0502040204020203" pitchFamily="34" charset="0"/>
               </a:rPr>
-              <a:t>requireJS</a:t>
-            </a:r>
+              <a:t>a software testing method by </a:t>
+            </a:r>
+            <a:r>
+              <a:rPr lang="en-US" dirty="0">
+                <a:latin typeface="Segoe UI Light" panose="020B0502040204020203" pitchFamily="34" charset="0"/>
+                <a:cs typeface="Segoe UI Light" panose="020B0502040204020203" pitchFamily="34" charset="0"/>
+              </a:rPr>
+              <a:t>which individual units </a:t>
+            </a:r>
+            <a:r>
+              <a:rPr lang="en-US" dirty="0" smtClean="0">
+                <a:latin typeface="Segoe UI Light" panose="020B0502040204020203" pitchFamily="34" charset="0"/>
+                <a:cs typeface="Segoe UI Light" panose="020B0502040204020203" pitchFamily="34" charset="0"/>
+              </a:rPr>
+              <a:t>of source code, </a:t>
+            </a:r>
+            <a:r>
+              <a:rPr lang="en-US" dirty="0">
+                <a:latin typeface="Segoe UI Light" panose="020B0502040204020203" pitchFamily="34" charset="0"/>
+                <a:cs typeface="Segoe UI Light" panose="020B0502040204020203" pitchFamily="34" charset="0"/>
+              </a:rPr>
+              <a:t>sets of one or more computer program modules </a:t>
+            </a:r>
+            <a:r>
+              <a:rPr lang="en-US" dirty="0">
+                <a:latin typeface="Segoe UI Light" panose="020B0502040204020203" pitchFamily="34" charset="0"/>
+                <a:cs typeface="Segoe UI Light" panose="020B0502040204020203" pitchFamily="34" charset="0"/>
+              </a:rPr>
+              <a:t>together, </a:t>
+            </a:r>
+            <a:r>
+              <a:rPr lang="en-US" dirty="0">
+                <a:latin typeface="Segoe UI Light" panose="020B0502040204020203" pitchFamily="34" charset="0"/>
+                <a:cs typeface="Segoe UI Light" panose="020B0502040204020203" pitchFamily="34" charset="0"/>
+              </a:rPr>
+              <a:t>are tested to determine whether they are fit for use</a:t>
+            </a:r>
+            <a:r>
+              <a:rPr lang="en-US" dirty="0" smtClean="0">
+                <a:latin typeface="Segoe UI Light" panose="020B0502040204020203" pitchFamily="34" charset="0"/>
+                <a:cs typeface="Segoe UI Light" panose="020B0502040204020203" pitchFamily="34" charset="0"/>
+              </a:rPr>
+              <a:t>.</a:t>
+            </a:r>
+          </a:p>
+          <a:p>
+            <a:pPr marL="285750" indent="-285750">
+              <a:buFont typeface="Arial" panose="020B0604020202020204" pitchFamily="34" charset="0"/>
+              <a:buChar char="•"/>
+            </a:pPr>
+            <a:r>
+              <a:rPr lang="en-US" dirty="0">
+                <a:latin typeface="Segoe UI Light" panose="020B0502040204020203" pitchFamily="34" charset="0"/>
+                <a:cs typeface="Segoe UI Light" panose="020B0502040204020203" pitchFamily="34" charset="0"/>
+              </a:rPr>
+              <a:t>Jasmine is a </a:t>
+            </a:r>
+            <a:r>
+              <a:rPr lang="en-US" b="1" dirty="0">
+                <a:latin typeface="Segoe UI Light" panose="020B0502040204020203" pitchFamily="34" charset="0"/>
+                <a:cs typeface="Segoe UI Light" panose="020B0502040204020203" pitchFamily="34" charset="0"/>
+              </a:rPr>
+              <a:t>behavior-driven development </a:t>
+            </a:r>
+            <a:r>
+              <a:rPr lang="en-US" dirty="0">
+                <a:latin typeface="Segoe UI Light" panose="020B0502040204020203" pitchFamily="34" charset="0"/>
+                <a:cs typeface="Segoe UI Light" panose="020B0502040204020203" pitchFamily="34" charset="0"/>
+              </a:rPr>
+              <a:t>framework for testing JavaScript </a:t>
+            </a:r>
+            <a:r>
+              <a:rPr lang="en-US" dirty="0" smtClean="0">
+                <a:latin typeface="Segoe UI Light" panose="020B0502040204020203" pitchFamily="34" charset="0"/>
+                <a:cs typeface="Segoe UI Light" panose="020B0502040204020203" pitchFamily="34" charset="0"/>
+              </a:rPr>
+              <a:t>code</a:t>
+            </a:r>
+          </a:p>
+          <a:p>
+            <a:pPr marL="285750" indent="-285750">
+              <a:buFont typeface="Arial" panose="020B0604020202020204" pitchFamily="34" charset="0"/>
+              <a:buChar char="•"/>
+            </a:pPr>
+            <a:r>
+              <a:rPr lang="en-US" dirty="0" smtClean="0">
+                <a:latin typeface="Segoe UI Light" panose="020B0502040204020203" pitchFamily="34" charset="0"/>
+                <a:cs typeface="Segoe UI Light" panose="020B0502040204020203" pitchFamily="34" charset="0"/>
+              </a:rPr>
+              <a:t>Suites, specifications and </a:t>
+            </a:r>
+            <a:r>
+              <a:rPr lang="en-US" dirty="0" err="1" smtClean="0">
+                <a:latin typeface="Segoe UI Light" panose="020B0502040204020203" pitchFamily="34" charset="0"/>
+                <a:cs typeface="Segoe UI Light" panose="020B0502040204020203" pitchFamily="34" charset="0"/>
+              </a:rPr>
+              <a:t>expectactions</a:t>
+            </a:r>
+            <a:endParaRPr lang="en-US" dirty="0" smtClean="0">
+              <a:latin typeface="Segoe UI Light" panose="020B0502040204020203" pitchFamily="34" charset="0"/>
+              <a:cs typeface="Segoe UI Light" panose="020B0502040204020203" pitchFamily="34" charset="0"/>
+            </a:endParaRPr>
+          </a:p>
+          <a:p>
+            <a:pPr marL="285750" indent="-285750">
+              <a:buFont typeface="Arial" panose="020B0604020202020204" pitchFamily="34" charset="0"/>
+              <a:buChar char="•"/>
+            </a:pPr>
+            <a:r>
+              <a:rPr lang="en-US" dirty="0">
+                <a:latin typeface="Segoe UI Light" panose="020B0502040204020203" pitchFamily="34" charset="0"/>
+                <a:cs typeface="Segoe UI Light" panose="020B0502040204020203" pitchFamily="34" charset="0"/>
+              </a:rPr>
+              <a:t>http://jasmine.github.io/edge/introduction.html</a:t>
+            </a:r>
+          </a:p>
+          <a:p>
             <a:endParaRPr lang="en-US" dirty="0">
               <a:latin typeface="Segoe UI Light" panose="020B0502040204020203" pitchFamily="34" charset="0"/>
               <a:cs typeface="Segoe UI Light" panose="020B0502040204020203" pitchFamily="34" charset="0"/>
             </a:endParaRPr>
-          </a:p>
-          <a:p>
-            <a:pPr marL="742950" lvl="1" indent="-285750">
-              <a:buFont typeface="Arial" panose="020B0604020202020204" pitchFamily="34" charset="0"/>
-              <a:buChar char="•"/>
-            </a:pPr>
-            <a:r>
-              <a:rPr lang="en-US" dirty="0">
-                <a:latin typeface="Segoe UI Light" panose="020B0502040204020203" pitchFamily="34" charset="0"/>
-                <a:cs typeface="Segoe UI Light" panose="020B0502040204020203" pitchFamily="34" charset="0"/>
-              </a:rPr>
-              <a:t>Import</a:t>
-            </a:r>
-          </a:p>
-          <a:p>
-            <a:pPr lvl="1"/>
-            <a:r>
-              <a:rPr lang="en-US" dirty="0">
-                <a:latin typeface="Segoe UI Light" panose="020B0502040204020203" pitchFamily="34" charset="0"/>
-                <a:cs typeface="Segoe UI Light" panose="020B0502040204020203" pitchFamily="34" charset="0"/>
-              </a:rPr>
-              <a:t>As the not all the browsers support  ECMAScript 6 we have to translate it using Babel</a:t>
-            </a:r>
-          </a:p>
-          <a:p>
-            <a:pPr lvl="1"/>
-            <a:r>
-              <a:rPr lang="en-US" dirty="0">
-                <a:latin typeface="Segoe UI Light" panose="020B0502040204020203" pitchFamily="34" charset="0"/>
-                <a:cs typeface="Segoe UI Light" panose="020B0502040204020203" pitchFamily="34" charset="0"/>
-                <a:hlinkClick r:id="rId2"/>
-              </a:rPr>
-              <a:t>https://babeljs.io/docs/setup/#webpack</a:t>
-            </a:r>
-            <a:r>
-              <a:rPr lang="en-US" dirty="0">
-                <a:latin typeface="Segoe UI Light" panose="020B0502040204020203" pitchFamily="34" charset="0"/>
-                <a:cs typeface="Segoe UI Light" panose="020B0502040204020203" pitchFamily="34" charset="0"/>
-              </a:rPr>
-              <a:t> &amp; https://github.com/babel/babel-loader</a:t>
-            </a:r>
           </a:p>
         </p:txBody>
       </p:sp>
@@ -16697,6 +16703,13 @@
   <p:clrMapOvr>
     <a:masterClrMapping/>
   </p:clrMapOvr>
+  <p:timing>
+    <p:tnLst>
+      <p:par>
+        <p:cTn id="1" dur="indefinite" restart="never" nodeType="tmRoot"/>
+      </p:par>
+    </p:tnLst>
+  </p:timing>
 </p:sld>
 </file>
 
@@ -16734,8 +16747,13 @@
           <a:p>
             <a:r>
               <a:rPr lang="en-US" dirty="0"/>
-              <a:t>Using  ES6 I</a:t>
-            </a:r>
+              <a:t>Using  </a:t>
+            </a:r>
+            <a:r>
+              <a:rPr lang="en-US" dirty="0" smtClean="0"/>
+              <a:t>Jasmine</a:t>
+            </a:r>
+            <a:endParaRPr lang="en-US" dirty="0"/>
           </a:p>
         </p:txBody>
       </p:sp>
@@ -16748,7 +16766,7 @@
         <p:spPr>
           <a:xfrm>
             <a:off x="1232647" y="1690688"/>
-            <a:ext cx="10291482" cy="1538883"/>
+            <a:ext cx="10291482" cy="1785104"/>
           </a:xfrm>
           <a:prstGeom prst="rect">
             <a:avLst/>
@@ -16761,74 +16779,86 @@
           <a:lstStyle/>
           <a:p>
             <a:r>
+              <a:rPr lang="en-US" sz="2200" dirty="0" smtClean="0">
+                <a:latin typeface="Segoe UI Light" panose="020B0502040204020203" pitchFamily="34" charset="0"/>
+                <a:cs typeface="Segoe UI Light" panose="020B0502040204020203" pitchFamily="34" charset="0"/>
+              </a:rPr>
+              <a:t>Exercise 7a. Unit test that the </a:t>
+            </a:r>
+            <a:r>
+              <a:rPr lang="en-US" sz="2200" dirty="0" err="1" smtClean="0">
+                <a:latin typeface="Segoe UI Light" panose="020B0502040204020203" pitchFamily="34" charset="0"/>
+                <a:cs typeface="Segoe UI Light" panose="020B0502040204020203" pitchFamily="34" charset="0"/>
+              </a:rPr>
+              <a:t>moviesListControler</a:t>
+            </a:r>
+            <a:r>
+              <a:rPr lang="en-US" sz="2200" dirty="0" smtClean="0">
+                <a:latin typeface="Segoe UI Light" panose="020B0502040204020203" pitchFamily="34" charset="0"/>
+                <a:cs typeface="Segoe UI Light" panose="020B0502040204020203" pitchFamily="34" charset="0"/>
+              </a:rPr>
+              <a:t> has three movies</a:t>
+            </a:r>
+          </a:p>
+          <a:p>
+            <a:pPr marL="800100" lvl="1" indent="-342900">
+              <a:buFont typeface="Arial" panose="020B0604020202020204" pitchFamily="34" charset="0"/>
+              <a:buChar char="•"/>
+            </a:pPr>
+            <a:r>
+              <a:rPr lang="en-US" sz="2200" dirty="0" smtClean="0">
+                <a:latin typeface="Segoe UI Light" panose="020B0502040204020203" pitchFamily="34" charset="0"/>
+                <a:cs typeface="Segoe UI Light" panose="020B0502040204020203" pitchFamily="34" charset="0"/>
+              </a:rPr>
+              <a:t>Install jasmine, jasmine-core</a:t>
+            </a:r>
+          </a:p>
+          <a:p>
+            <a:pPr marL="800100" lvl="1" indent="-342900">
+              <a:buFont typeface="Arial" panose="020B0604020202020204" pitchFamily="34" charset="0"/>
+              <a:buChar char="•"/>
+            </a:pPr>
+            <a:r>
+              <a:rPr lang="en-US" sz="2200" dirty="0" smtClean="0">
+                <a:latin typeface="Segoe UI Light" panose="020B0502040204020203" pitchFamily="34" charset="0"/>
+                <a:cs typeface="Segoe UI Light" panose="020B0502040204020203" pitchFamily="34" charset="0"/>
+              </a:rPr>
+              <a:t>Install angular-mocks</a:t>
+            </a:r>
+          </a:p>
+          <a:p>
+            <a:pPr marL="800100" lvl="1" indent="-342900">
+              <a:buFont typeface="Arial" panose="020B0604020202020204" pitchFamily="34" charset="0"/>
+              <a:buChar char="•"/>
+            </a:pPr>
+            <a:r>
               <a:rPr lang="en-US" sz="2200" dirty="0">
                 <a:latin typeface="Segoe UI Light" panose="020B0502040204020203" pitchFamily="34" charset="0"/>
                 <a:cs typeface="Segoe UI Light" panose="020B0502040204020203" pitchFamily="34" charset="0"/>
               </a:rPr>
-              <a:t>Do Exercise 2.</a:t>
-            </a:r>
-          </a:p>
-          <a:p>
-            <a:pPr lvl="1"/>
-            <a:r>
-              <a:rPr lang="en-US" dirty="0">
-                <a:latin typeface="Segoe UI Light" panose="020B0502040204020203" pitchFamily="34" charset="0"/>
-                <a:cs typeface="Segoe UI Light" panose="020B0502040204020203" pitchFamily="34" charset="0"/>
-              </a:rPr>
-              <a:t>Modify Exercise 1 to use ECMAScript 6 syntax instead </a:t>
-            </a:r>
-            <a:r>
-              <a:rPr lang="en-US" dirty="0" err="1">
-                <a:latin typeface="Segoe UI Light" panose="020B0502040204020203" pitchFamily="34" charset="0"/>
-                <a:cs typeface="Segoe UI Light" panose="020B0502040204020203" pitchFamily="34" charset="0"/>
-              </a:rPr>
-              <a:t>requireJS</a:t>
-            </a:r>
-            <a:endParaRPr lang="en-US" dirty="0">
+              <a:t>https://docs.angularjs.org/guide/unit-testing</a:t>
+            </a:r>
+            <a:endParaRPr lang="en-US" sz="2200" dirty="0" smtClean="0">
               <a:latin typeface="Segoe UI Light" panose="020B0502040204020203" pitchFamily="34" charset="0"/>
               <a:cs typeface="Segoe UI Light" panose="020B0502040204020203" pitchFamily="34" charset="0"/>
             </a:endParaRPr>
           </a:p>
           <a:p>
-            <a:pPr marL="742950" lvl="1" indent="-285750">
+            <a:pPr marL="342900" indent="-342900">
               <a:buFont typeface="Arial" panose="020B0604020202020204" pitchFamily="34" charset="0"/>
               <a:buChar char="•"/>
             </a:pPr>
             <a:r>
-              <a:rPr lang="en-US" dirty="0">
+              <a:rPr lang="en-US" sz="2200" dirty="0" smtClean="0">
                 <a:latin typeface="Segoe UI Light" panose="020B0502040204020203" pitchFamily="34" charset="0"/>
                 <a:cs typeface="Segoe UI Light" panose="020B0502040204020203" pitchFamily="34" charset="0"/>
               </a:rPr>
-              <a:t>Import</a:t>
-            </a:r>
-          </a:p>
-          <a:p>
-            <a:pPr lvl="1"/>
-            <a:r>
-              <a:rPr lang="en-US" dirty="0">
-                <a:latin typeface="Segoe UI Light" panose="020B0502040204020203" pitchFamily="34" charset="0"/>
-                <a:cs typeface="Segoe UI Light" panose="020B0502040204020203" pitchFamily="34" charset="0"/>
-              </a:rPr>
-              <a:t>As the not all the browsers support  ECMAScript 6 we have to translate it using Babel</a:t>
-            </a:r>
-          </a:p>
-          <a:p>
-            <a:pPr lvl="1"/>
-            <a:r>
-              <a:rPr lang="en-US" dirty="0">
-                <a:latin typeface="Segoe UI Light" panose="020B0502040204020203" pitchFamily="34" charset="0"/>
-                <a:cs typeface="Segoe UI Light" panose="020B0502040204020203" pitchFamily="34" charset="0"/>
-                <a:hlinkClick r:id="rId2"/>
-              </a:rPr>
-              <a:t>https://babeljs.io/docs/setup/#webpack</a:t>
-            </a:r>
-            <a:r>
-              <a:rPr lang="en-US" dirty="0">
-                <a:latin typeface="Segoe UI Light" panose="020B0502040204020203" pitchFamily="34" charset="0"/>
-                <a:cs typeface="Segoe UI Light" panose="020B0502040204020203" pitchFamily="34" charset="0"/>
-              </a:rPr>
-              <a:t> &amp; https://github.com/babel/babel-loader</a:t>
-            </a:r>
+              <a:t>Execute through jasmine-standalone</a:t>
+            </a:r>
+            <a:endParaRPr lang="en-US" sz="2200" dirty="0">
+              <a:latin typeface="Segoe UI Light" panose="020B0502040204020203" pitchFamily="34" charset="0"/>
+              <a:cs typeface="Segoe UI Light" panose="020B0502040204020203" pitchFamily="34" charset="0"/>
+            </a:endParaRPr>
           </a:p>
         </p:txBody>
       </p:sp>
@@ -16842,10 +16872,240 @@
   <p:clrMapOvr>
     <a:masterClrMapping/>
   </p:clrMapOvr>
+  <p:timing>
+    <p:tnLst>
+      <p:par>
+        <p:cTn id="1" dur="indefinite" restart="never" nodeType="tmRoot"/>
+      </p:par>
+    </p:tnLst>
+  </p:timing>
 </p:sld>
 </file>
 
 <file path=ppt/slides/slide16.xml><?xml version="1.0" encoding="utf-8"?>
+<p:sld xmlns:a="http://schemas.openxmlformats.org/drawingml/2006/main" xmlns:r="http://schemas.openxmlformats.org/officeDocument/2006/relationships" xmlns:p="http://schemas.openxmlformats.org/presentationml/2006/main">
+  <p:cSld>
+    <p:spTree>
+      <p:nvGrpSpPr>
+        <p:cNvPr id="1" name=""/>
+        <p:cNvGrpSpPr/>
+        <p:nvPr/>
+      </p:nvGrpSpPr>
+      <p:grpSpPr>
+        <a:xfrm>
+          <a:off x="0" y="0"/>
+          <a:ext cx="0" cy="0"/>
+          <a:chOff x="0" y="0"/>
+          <a:chExt cx="0" cy="0"/>
+        </a:xfrm>
+      </p:grpSpPr>
+      <p:sp>
+        <p:nvSpPr>
+          <p:cNvPr id="2" name="Título 1"/>
+          <p:cNvSpPr>
+            <a:spLocks noGrp="1"/>
+          </p:cNvSpPr>
+          <p:nvPr>
+            <p:ph type="title"/>
+          </p:nvPr>
+        </p:nvSpPr>
+        <p:spPr/>
+        <p:txBody>
+          <a:bodyPr/>
+          <a:lstStyle/>
+          <a:p>
+            <a:r>
+              <a:rPr lang="en-US" dirty="0"/>
+              <a:t>Using  </a:t>
+            </a:r>
+            <a:r>
+              <a:rPr lang="en-US" dirty="0" smtClean="0"/>
+              <a:t>karma</a:t>
+            </a:r>
+            <a:endParaRPr lang="en-US" dirty="0"/>
+          </a:p>
+        </p:txBody>
+      </p:sp>
+      <p:sp>
+        <p:nvSpPr>
+          <p:cNvPr id="3" name="Rectángulo 2"/>
+          <p:cNvSpPr/>
+          <p:nvPr/>
+        </p:nvSpPr>
+        <p:spPr>
+          <a:xfrm>
+            <a:off x="1232647" y="1690688"/>
+            <a:ext cx="10291482" cy="2123658"/>
+          </a:xfrm>
+          <a:prstGeom prst="rect">
+            <a:avLst/>
+          </a:prstGeom>
+        </p:spPr>
+        <p:txBody>
+          <a:bodyPr wrap="square">
+            <a:spAutoFit/>
+          </a:bodyPr>
+          <a:lstStyle/>
+          <a:p>
+            <a:r>
+              <a:rPr lang="en-US" sz="2200" dirty="0" smtClean="0">
+                <a:latin typeface="Segoe UI Light" panose="020B0502040204020203" pitchFamily="34" charset="0"/>
+                <a:cs typeface="Segoe UI Light" panose="020B0502040204020203" pitchFamily="34" charset="0"/>
+              </a:rPr>
+              <a:t>Karma is a test runner. A tool that </a:t>
+            </a:r>
+            <a:r>
+              <a:rPr lang="en-US" sz="2200" dirty="0" err="1" smtClean="0">
+                <a:latin typeface="Segoe UI Light" panose="020B0502040204020203" pitchFamily="34" charset="0"/>
+                <a:cs typeface="Segoe UI Light" panose="020B0502040204020203" pitchFamily="34" charset="0"/>
+              </a:rPr>
+              <a:t>automatices</a:t>
+            </a:r>
+            <a:r>
+              <a:rPr lang="en-US" sz="2200" dirty="0" smtClean="0">
+                <a:latin typeface="Segoe UI Light" panose="020B0502040204020203" pitchFamily="34" charset="0"/>
+                <a:cs typeface="Segoe UI Light" panose="020B0502040204020203" pitchFamily="34" charset="0"/>
+              </a:rPr>
+              <a:t> the task of discover and execute tests</a:t>
+            </a:r>
+          </a:p>
+          <a:p>
+            <a:r>
+              <a:rPr lang="en-US" sz="2200" dirty="0" smtClean="0">
+                <a:latin typeface="Segoe UI Light" panose="020B0502040204020203" pitchFamily="34" charset="0"/>
+                <a:cs typeface="Segoe UI Light" panose="020B0502040204020203" pitchFamily="34" charset="0"/>
+              </a:rPr>
+              <a:t>Exercise 7b. </a:t>
+            </a:r>
+            <a:r>
+              <a:rPr lang="en-US" sz="2200" dirty="0" smtClean="0">
+                <a:latin typeface="Segoe UI Light" panose="020B0502040204020203" pitchFamily="34" charset="0"/>
+                <a:cs typeface="Segoe UI Light" panose="020B0502040204020203" pitchFamily="34" charset="0"/>
+              </a:rPr>
+              <a:t>Execute test create in exercise 7a to run through karma</a:t>
+            </a:r>
+          </a:p>
+          <a:p>
+            <a:pPr marL="342900" indent="-342900">
+              <a:buFont typeface="Arial" panose="020B0604020202020204" pitchFamily="34" charset="0"/>
+              <a:buChar char="•"/>
+            </a:pPr>
+            <a:r>
+              <a:rPr lang="en-US" sz="2200" dirty="0">
+                <a:latin typeface="Segoe UI Light" panose="020B0502040204020203" pitchFamily="34" charset="0"/>
+                <a:cs typeface="Segoe UI Light" panose="020B0502040204020203" pitchFamily="34" charset="0"/>
+              </a:rPr>
+              <a:t>Install karma </a:t>
+            </a:r>
+            <a:r>
+              <a:rPr lang="en-US" sz="2200" dirty="0">
+                <a:latin typeface="Segoe UI Light" panose="020B0502040204020203" pitchFamily="34" charset="0"/>
+                <a:cs typeface="Segoe UI Light" panose="020B0502040204020203" pitchFamily="34" charset="0"/>
+                <a:hlinkClick r:id="rId2"/>
+              </a:rPr>
+              <a:t>https://</a:t>
+            </a:r>
+            <a:r>
+              <a:rPr lang="en-US" sz="2200" dirty="0" smtClean="0">
+                <a:latin typeface="Segoe UI Light" panose="020B0502040204020203" pitchFamily="34" charset="0"/>
+                <a:cs typeface="Segoe UI Light" panose="020B0502040204020203" pitchFamily="34" charset="0"/>
+                <a:hlinkClick r:id="rId2"/>
+              </a:rPr>
+              <a:t>karma-runner.github.io/0.13/intro/installation.html</a:t>
+            </a:r>
+            <a:endParaRPr lang="en-US" sz="2200" dirty="0" smtClean="0">
+              <a:latin typeface="Segoe UI Light" panose="020B0502040204020203" pitchFamily="34" charset="0"/>
+              <a:cs typeface="Segoe UI Light" panose="020B0502040204020203" pitchFamily="34" charset="0"/>
+            </a:endParaRPr>
+          </a:p>
+          <a:p>
+            <a:pPr marL="342900" indent="-342900">
+              <a:buFont typeface="Arial" panose="020B0604020202020204" pitchFamily="34" charset="0"/>
+              <a:buChar char="•"/>
+            </a:pPr>
+            <a:r>
+              <a:rPr lang="en-US" sz="2200" dirty="0">
+                <a:latin typeface="Segoe UI Light" panose="020B0502040204020203" pitchFamily="34" charset="0"/>
+                <a:cs typeface="Segoe UI Light" panose="020B0502040204020203" pitchFamily="34" charset="0"/>
+              </a:rPr>
+              <a:t>Add </a:t>
+            </a:r>
+            <a:r>
+              <a:rPr lang="en-US" sz="2200" dirty="0" smtClean="0">
+                <a:latin typeface="Segoe UI Light" panose="020B0502040204020203" pitchFamily="34" charset="0"/>
+                <a:cs typeface="Segoe UI Light" panose="020B0502040204020203" pitchFamily="34" charset="0"/>
+              </a:rPr>
+              <a:t>karma-</a:t>
+            </a:r>
+            <a:r>
+              <a:rPr lang="en-US" sz="2200" dirty="0" err="1" smtClean="0">
+                <a:latin typeface="Segoe UI Light" panose="020B0502040204020203" pitchFamily="34" charset="0"/>
+                <a:cs typeface="Segoe UI Light" panose="020B0502040204020203" pitchFamily="34" charset="0"/>
+              </a:rPr>
+              <a:t>webpack</a:t>
+            </a:r>
+            <a:endParaRPr lang="en-US" sz="2200" dirty="0" smtClean="0">
+              <a:latin typeface="Segoe UI Light" panose="020B0502040204020203" pitchFamily="34" charset="0"/>
+              <a:cs typeface="Segoe UI Light" panose="020B0502040204020203" pitchFamily="34" charset="0"/>
+            </a:endParaRPr>
+          </a:p>
+          <a:p>
+            <a:pPr marL="342900" indent="-342900">
+              <a:buFont typeface="Arial" panose="020B0604020202020204" pitchFamily="34" charset="0"/>
+              <a:buChar char="•"/>
+            </a:pPr>
+            <a:r>
+              <a:rPr lang="en-US" sz="2200" dirty="0" smtClean="0">
+                <a:latin typeface="Segoe UI Light" panose="020B0502040204020203" pitchFamily="34" charset="0"/>
+                <a:cs typeface="Segoe UI Light" panose="020B0502040204020203" pitchFamily="34" charset="0"/>
+              </a:rPr>
+              <a:t>Modify karma to load angular-mocks and jasmine </a:t>
+            </a:r>
+            <a:r>
+              <a:rPr lang="en-US" sz="2200" dirty="0" err="1" smtClean="0">
+                <a:latin typeface="Segoe UI Light" panose="020B0502040204020203" pitchFamily="34" charset="0"/>
+                <a:cs typeface="Segoe UI Light" panose="020B0502040204020203" pitchFamily="34" charset="0"/>
+              </a:rPr>
+              <a:t>lybrary</a:t>
+            </a:r>
+            <a:endParaRPr lang="en-US" sz="2200" dirty="0" smtClean="0">
+              <a:latin typeface="Segoe UI Light" panose="020B0502040204020203" pitchFamily="34" charset="0"/>
+              <a:cs typeface="Segoe UI Light" panose="020B0502040204020203" pitchFamily="34" charset="0"/>
+            </a:endParaRPr>
+          </a:p>
+          <a:p>
+            <a:pPr marL="342900" indent="-342900">
+              <a:buFont typeface="Arial" panose="020B0604020202020204" pitchFamily="34" charset="0"/>
+              <a:buChar char="•"/>
+            </a:pPr>
+            <a:endParaRPr lang="en-US" sz="2200" dirty="0" smtClean="0">
+              <a:latin typeface="Segoe UI Light" panose="020B0502040204020203" pitchFamily="34" charset="0"/>
+              <a:cs typeface="Segoe UI Light" panose="020B0502040204020203" pitchFamily="34" charset="0"/>
+            </a:endParaRPr>
+          </a:p>
+        </p:txBody>
+      </p:sp>
+    </p:spTree>
+    <p:extLst>
+      <p:ext uri="{BB962C8B-B14F-4D97-AF65-F5344CB8AC3E}">
+        <p14:creationId xmlns:p14="http://schemas.microsoft.com/office/powerpoint/2010/main" val="413772261"/>
+      </p:ext>
+    </p:extLst>
+  </p:cSld>
+  <p:clrMapOvr>
+    <a:masterClrMapping/>
+  </p:clrMapOvr>
+  <p:timing>
+    <p:tnLst>
+      <p:par>
+        <p:cTn id="1" dur="indefinite" restart="never" nodeType="tmRoot"/>
+      </p:par>
+    </p:tnLst>
+  </p:timing>
+</p:sld>
+</file>
+
+<file path=ppt/slides/slide17.xml><?xml version="1.0" encoding="utf-8"?>
 <p:sld xmlns:a="http://schemas.openxmlformats.org/drawingml/2006/main" xmlns:r="http://schemas.openxmlformats.org/officeDocument/2006/relationships" xmlns:p="http://schemas.openxmlformats.org/presentationml/2006/main">
   <p:cSld>
     <p:spTree>
@@ -18992,7 +19252,7 @@
   <a:extraClrSchemeLst/>
   <a:extLst>
     <a:ext uri="{05A4C25C-085E-4340-85A3-A5531E510DB2}">
-      <thm15:themeFamily xmlns:thm15="http://schemas.microsoft.com/office/thememl/2012/main" name="Office Theme" id="{62F939B6-93AF-4DB8-9C6B-D6C7DFDC589F}" vid="{4A3C46E8-61CC-4603-A589-7422A47A8E4A}"/>
+      <thm15:themeFamily xmlns:thm15="http://schemas.microsoft.com/office/thememl/2012/main" xmlns="" name="Office Theme" id="{62F939B6-93AF-4DB8-9C6B-D6C7DFDC589F}" vid="{4A3C46E8-61CC-4603-A589-7422A47A8E4A}"/>
     </a:ext>
   </a:extLst>
 </a:theme>
@@ -19253,7 +19513,7 @@
   <a:extraClrSchemeLst/>
   <a:extLst>
     <a:ext uri="{05A4C25C-085E-4340-85A3-A5531E510DB2}">
-      <thm15:themeFamily xmlns:thm15="http://schemas.microsoft.com/office/thememl/2012/main" name="Office Theme" id="{62F939B6-93AF-4DB8-9C6B-D6C7DFDC589F}" vid="{4A3C46E8-61CC-4603-A589-7422A47A8E4A}"/>
+      <thm15:themeFamily xmlns:thm15="http://schemas.microsoft.com/office/thememl/2012/main" xmlns="" name="Office Theme" id="{62F939B6-93AF-4DB8-9C6B-D6C7DFDC589F}" vid="{4A3C46E8-61CC-4603-A589-7422A47A8E4A}"/>
     </a:ext>
   </a:extLst>
 </a:theme>
@@ -19514,7 +19774,7 @@
   <a:extraClrSchemeLst/>
   <a:extLst>
     <a:ext uri="{05A4C25C-085E-4340-85A3-A5531E510DB2}">
-      <thm15:themeFamily xmlns:thm15="http://schemas.microsoft.com/office/thememl/2012/main" name="Office Theme" id="{62F939B6-93AF-4DB8-9C6B-D6C7DFDC589F}" vid="{4A3C46E8-61CC-4603-A589-7422A47A8E4A}"/>
+      <thm15:themeFamily xmlns:thm15="http://schemas.microsoft.com/office/thememl/2012/main" xmlns="" name="Office Theme" id="{62F939B6-93AF-4DB8-9C6B-D6C7DFDC589F}" vid="{4A3C46E8-61CC-4603-A589-7422A47A8E4A}"/>
     </a:ext>
   </a:extLst>
 </a:theme>
@@ -19775,7 +20035,7 @@
   <a:extraClrSchemeLst/>
   <a:extLst>
     <a:ext uri="{05A4C25C-085E-4340-85A3-A5531E510DB2}">
-      <thm15:themeFamily xmlns:thm15="http://schemas.microsoft.com/office/thememl/2012/main" name="Office Theme" id="{62F939B6-93AF-4DB8-9C6B-D6C7DFDC589F}" vid="{4A3C46E8-61CC-4603-A589-7422A47A8E4A}"/>
+      <thm15:themeFamily xmlns:thm15="http://schemas.microsoft.com/office/thememl/2012/main" xmlns="" name="Office Theme" id="{62F939B6-93AF-4DB8-9C6B-D6C7DFDC589F}" vid="{4A3C46E8-61CC-4603-A589-7422A47A8E4A}"/>
     </a:ext>
   </a:extLst>
 </a:theme>
@@ -20036,7 +20296,7 @@
   <a:extraClrSchemeLst/>
   <a:extLst>
     <a:ext uri="{05A4C25C-085E-4340-85A3-A5531E510DB2}">
-      <thm15:themeFamily xmlns:thm15="http://schemas.microsoft.com/office/thememl/2012/main" name="Office Theme" id="{62F939B6-93AF-4DB8-9C6B-D6C7DFDC589F}" vid="{4A3C46E8-61CC-4603-A589-7422A47A8E4A}"/>
+      <thm15:themeFamily xmlns:thm15="http://schemas.microsoft.com/office/thememl/2012/main" xmlns="" name="Office Theme" id="{62F939B6-93AF-4DB8-9C6B-D6C7DFDC589F}" vid="{4A3C46E8-61CC-4603-A589-7422A47A8E4A}"/>
     </a:ext>
   </a:extLst>
 </a:theme>
@@ -20297,7 +20557,7 @@
   <a:extraClrSchemeLst/>
   <a:extLst>
     <a:ext uri="{05A4C25C-085E-4340-85A3-A5531E510DB2}">
-      <thm15:themeFamily xmlns:thm15="http://schemas.microsoft.com/office/thememl/2012/main" name="Office Theme" id="{62F939B6-93AF-4DB8-9C6B-D6C7DFDC589F}" vid="{4A3C46E8-61CC-4603-A589-7422A47A8E4A}"/>
+      <thm15:themeFamily xmlns:thm15="http://schemas.microsoft.com/office/thememl/2012/main" xmlns="" name="Office Theme" id="{62F939B6-93AF-4DB8-9C6B-D6C7DFDC589F}" vid="{4A3C46E8-61CC-4603-A589-7422A47A8E4A}"/>
     </a:ext>
   </a:extLst>
 </a:theme>
@@ -20558,7 +20818,7 @@
   <a:extraClrSchemeLst/>
   <a:extLst>
     <a:ext uri="{05A4C25C-085E-4340-85A3-A5531E510DB2}">
-      <thm15:themeFamily xmlns:thm15="http://schemas.microsoft.com/office/thememl/2012/main" name="Office Theme" id="{62F939B6-93AF-4DB8-9C6B-D6C7DFDC589F}" vid="{4A3C46E8-61CC-4603-A589-7422A47A8E4A}"/>
+      <thm15:themeFamily xmlns:thm15="http://schemas.microsoft.com/office/thememl/2012/main" xmlns="" name="Office Theme" id="{62F939B6-93AF-4DB8-9C6B-D6C7DFDC589F}" vid="{4A3C46E8-61CC-4603-A589-7422A47A8E4A}"/>
     </a:ext>
   </a:extLst>
 </a:theme>
@@ -20819,7 +21079,7 @@
   <a:extraClrSchemeLst/>
   <a:extLst>
     <a:ext uri="{05A4C25C-085E-4340-85A3-A5531E510DB2}">
-      <thm15:themeFamily xmlns:thm15="http://schemas.microsoft.com/office/thememl/2012/main" name="Office Theme" id="{62F939B6-93AF-4DB8-9C6B-D6C7DFDC589F}" vid="{4A3C46E8-61CC-4603-A589-7422A47A8E4A}"/>
+      <thm15:themeFamily xmlns:thm15="http://schemas.microsoft.com/office/thememl/2012/main" xmlns="" name="Office Theme" id="{62F939B6-93AF-4DB8-9C6B-D6C7DFDC589F}" vid="{4A3C46E8-61CC-4603-A589-7422A47A8E4A}"/>
     </a:ext>
   </a:extLst>
 </a:theme>
@@ -21080,7 +21340,7 @@
   <a:extraClrSchemeLst/>
   <a:extLst>
     <a:ext uri="{05A4C25C-085E-4340-85A3-A5531E510DB2}">
-      <thm15:themeFamily xmlns:thm15="http://schemas.microsoft.com/office/thememl/2012/main" name="Office Theme" id="{62F939B6-93AF-4DB8-9C6B-D6C7DFDC589F}" vid="{4A3C46E8-61CC-4603-A589-7422A47A8E4A}"/>
+      <thm15:themeFamily xmlns:thm15="http://schemas.microsoft.com/office/thememl/2012/main" xmlns="" name="Office Theme" id="{62F939B6-93AF-4DB8-9C6B-D6C7DFDC589F}" vid="{4A3C46E8-61CC-4603-A589-7422A47A8E4A}"/>
     </a:ext>
   </a:extLst>
 </a:theme>
@@ -21341,13 +21601,37 @@
   <a:extraClrSchemeLst/>
   <a:extLst>
     <a:ext uri="{05A4C25C-085E-4340-85A3-A5531E510DB2}">
-      <thm15:themeFamily xmlns:thm15="http://schemas.microsoft.com/office/thememl/2012/main" name="Office Theme" id="{62F939B6-93AF-4DB8-9C6B-D6C7DFDC589F}" vid="{4A3C46E8-61CC-4603-A589-7422A47A8E4A}"/>
+      <thm15:themeFamily xmlns:thm15="http://schemas.microsoft.com/office/thememl/2012/main" xmlns="" name="Office Theme" id="{62F939B6-93AF-4DB8-9C6B-D6C7DFDC589F}" vid="{4A3C46E8-61CC-4603-A589-7422A47A8E4A}"/>
     </a:ext>
   </a:extLst>
 </a:theme>
 </file>
 
 <file path=customXml/item1.xml><?xml version="1.0" encoding="utf-8"?>
+<?mso-contentType ?>
+<FormTemplates xmlns="http://schemas.microsoft.com/sharepoint/v3/contenttype/forms">
+  <Display>DocumentLibraryForm</Display>
+  <Edit>DocumentLibraryForm</Edit>
+  <New>DocumentLibraryForm</New>
+</FormTemplates>
+</file>
+
+<file path=customXml/item2.xml><?xml version="1.0" encoding="utf-8"?>
+<p:properties xmlns:p="http://schemas.microsoft.com/office/2006/metadata/properties" xmlns:xsi="http://www.w3.org/2001/XMLSchema-instance" xmlns:pc="http://schemas.microsoft.com/office/infopath/2007/PartnerControls">
+  <documentManagement>
+    <TaxCatchAll xmlns="a55c6545-c4b0-41ba-b65e-41037e7c803f"/>
+    <SharedWithUsers xmlns="b048c077-1ef5-43d8-8cbe-0087f6733556">
+      <UserInfo>
+        <DisplayName>Todos excepto los usuarios externos</DisplayName>
+        <AccountId>181</AccountId>
+        <AccountType/>
+      </UserInfo>
+    </SharedWithUsers>
+  </documentManagement>
+</p:properties>
+</file>
+
+<file path=customXml/item3.xml><?xml version="1.0" encoding="utf-8"?>
 <ct:contentTypeSchema xmlns:ct="http://schemas.microsoft.com/office/2006/metadata/contentType" xmlns:ma="http://schemas.microsoft.com/office/2006/metadata/properties/metaAttributes" ct:_="" ma:_="" ma:contentTypeName="Documento" ma:contentTypeID="0x01010011374B617ED0E840AAD9696600400A02" ma:contentTypeVersion="9" ma:contentTypeDescription="Crear nuevo documento." ma:contentTypeScope="" ma:versionID="250dcc0a2ebb02d44b4ddffdd32b7dd2">
   <xsd:schema xmlns:xsd="http://www.w3.org/2001/XMLSchema" xmlns:xs="http://www.w3.org/2001/XMLSchema" xmlns:p="http://schemas.microsoft.com/office/2006/metadata/properties" xmlns:ns2="a55c6545-c4b0-41ba-b65e-41037e7c803f" xmlns:ns3="b048c077-1ef5-43d8-8cbe-0087f6733556" targetNamespace="http://schemas.microsoft.com/office/2006/metadata/properties" ma:root="true" ma:fieldsID="7a367e56634011d3948e6870b2482d1c" ns2:_="" ns3:_="">
     <xsd:import namespace="a55c6545-c4b0-41ba-b65e-41037e7c803f"/>
@@ -21518,45 +21802,10 @@
 </ct:contentTypeSchema>
 </file>
 
-<file path=customXml/item2.xml><?xml version="1.0" encoding="utf-8"?>
-<p:properties xmlns:p="http://schemas.microsoft.com/office/2006/metadata/properties" xmlns:xsi="http://www.w3.org/2001/XMLSchema-instance" xmlns:pc="http://schemas.microsoft.com/office/infopath/2007/PartnerControls">
-  <documentManagement>
-    <TaxCatchAll xmlns="a55c6545-c4b0-41ba-b65e-41037e7c803f"/>
-    <SharedWithUsers xmlns="b048c077-1ef5-43d8-8cbe-0087f6733556">
-      <UserInfo>
-        <DisplayName>Todos excepto los usuarios externos</DisplayName>
-        <AccountId>181</AccountId>
-        <AccountType/>
-      </UserInfo>
-    </SharedWithUsers>
-  </documentManagement>
-</p:properties>
-</file>
-
-<file path=customXml/item3.xml><?xml version="1.0" encoding="utf-8"?>
-<?mso-contentType ?>
-<FormTemplates xmlns="http://schemas.microsoft.com/sharepoint/v3/contenttype/forms">
-  <Display>DocumentLibraryForm</Display>
-  <Edit>DocumentLibraryForm</Edit>
-  <New>DocumentLibraryForm</New>
-</FormTemplates>
-</file>
-
 <file path=customXml/itemProps1.xml><?xml version="1.0" encoding="utf-8"?>
-<ds:datastoreItem xmlns:ds="http://schemas.openxmlformats.org/officeDocument/2006/customXml" ds:itemID="{40B01907-E433-4243-9A3E-9E9101133288}">
+<ds:datastoreItem xmlns:ds="http://schemas.openxmlformats.org/officeDocument/2006/customXml" ds:itemID="{5313EA09-C0DC-4015-ABE0-A5612D75F864}">
   <ds:schemaRefs>
-    <ds:schemaRef ds:uri="http://schemas.microsoft.com/office/2006/metadata/contentType"/>
-    <ds:schemaRef ds:uri="http://schemas.microsoft.com/office/2006/metadata/properties/metaAttributes"/>
-    <ds:schemaRef ds:uri="http://www.w3.org/2001/XMLSchema"/>
-    <ds:schemaRef ds:uri="http://schemas.microsoft.com/office/2006/metadata/properties"/>
-    <ds:schemaRef ds:uri="a55c6545-c4b0-41ba-b65e-41037e7c803f"/>
-    <ds:schemaRef ds:uri="b048c077-1ef5-43d8-8cbe-0087f6733556"/>
-    <ds:schemaRef ds:uri="http://schemas.microsoft.com/office/2006/documentManagement/types"/>
-    <ds:schemaRef ds:uri="http://schemas.microsoft.com/office/infopath/2007/PartnerControls"/>
-    <ds:schemaRef ds:uri="http://schemas.openxmlformats.org/package/2006/metadata/core-properties"/>
-    <ds:schemaRef ds:uri="http://purl.org/dc/elements/1.1/"/>
-    <ds:schemaRef ds:uri="http://purl.org/dc/terms/"/>
-    <ds:schemaRef ds:uri="http://schemas.microsoft.com/internal/obd"/>
+    <ds:schemaRef ds:uri="http://schemas.microsoft.com/sharepoint/v3/contenttype/forms"/>
   </ds:schemaRefs>
 </ds:datastoreItem>
 </file>
@@ -21579,9 +21828,20 @@
 </file>
 
 <file path=customXml/itemProps3.xml><?xml version="1.0" encoding="utf-8"?>
-<ds:datastoreItem xmlns:ds="http://schemas.openxmlformats.org/officeDocument/2006/customXml" ds:itemID="{5313EA09-C0DC-4015-ABE0-A5612D75F864}">
+<ds:datastoreItem xmlns:ds="http://schemas.openxmlformats.org/officeDocument/2006/customXml" ds:itemID="{40B01907-E433-4243-9A3E-9E9101133288}">
   <ds:schemaRefs>
-    <ds:schemaRef ds:uri="http://schemas.microsoft.com/sharepoint/v3/contenttype/forms"/>
+    <ds:schemaRef ds:uri="http://schemas.microsoft.com/office/2006/metadata/contentType"/>
+    <ds:schemaRef ds:uri="http://schemas.microsoft.com/office/2006/metadata/properties/metaAttributes"/>
+    <ds:schemaRef ds:uri="http://www.w3.org/2001/XMLSchema"/>
+    <ds:schemaRef ds:uri="http://schemas.microsoft.com/office/2006/metadata/properties"/>
+    <ds:schemaRef ds:uri="a55c6545-c4b0-41ba-b65e-41037e7c803f"/>
+    <ds:schemaRef ds:uri="b048c077-1ef5-43d8-8cbe-0087f6733556"/>
+    <ds:schemaRef ds:uri="http://schemas.microsoft.com/office/2006/documentManagement/types"/>
+    <ds:schemaRef ds:uri="http://schemas.microsoft.com/office/infopath/2007/PartnerControls"/>
+    <ds:schemaRef ds:uri="http://schemas.openxmlformats.org/package/2006/metadata/core-properties"/>
+    <ds:schemaRef ds:uri="http://purl.org/dc/elements/1.1/"/>
+    <ds:schemaRef ds:uri="http://purl.org/dc/terms/"/>
+    <ds:schemaRef ds:uri="http://schemas.microsoft.com/internal/obd"/>
   </ds:schemaRefs>
 </ds:datastoreItem>
 </file>
</xml_diff>